<commit_message>
Wed Feb 12 18:09:27 CST 2020
</commit_message>
<xml_diff>
--- a/LaTeX/MacOs系统/figure/all_figures.pptx
+++ b/LaTeX/MacOs系统/figure/all_figures.pptx
@@ -6,6 +6,7 @@
   </p:sldMasterIdLst>
   <p:sldIdLst>
     <p:sldId id="256" r:id="rId2"/>
+    <p:sldId id="257" r:id="rId3"/>
   </p:sldIdLst>
   <p:sldSz cx="12192000" cy="6858000"/>
   <p:notesSz cx="6858000" cy="9144000"/>
@@ -259,7 +260,7 @@
           <a:p>
             <a:fld id="{9860DD9F-B9F0-9442-B928-14853C54059E}" type="datetimeFigureOut">
               <a:rPr kumimoji="1" lang="zh-CN" altLang="en-US" smtClean="0"/>
-              <a:t>2020/2/11</a:t>
+              <a:t>2020/2/12</a:t>
             </a:fld>
             <a:endParaRPr kumimoji="1" lang="zh-CN" altLang="en-US"/>
           </a:p>
@@ -432,7 +433,7 @@
           <a:p>
             <a:fld id="{9860DD9F-B9F0-9442-B928-14853C54059E}" type="datetimeFigureOut">
               <a:rPr kumimoji="1" lang="zh-CN" altLang="en-US" smtClean="0"/>
-              <a:t>2020/2/11</a:t>
+              <a:t>2020/2/12</a:t>
             </a:fld>
             <a:endParaRPr kumimoji="1" lang="zh-CN" altLang="en-US"/>
           </a:p>
@@ -615,7 +616,7 @@
           <a:p>
             <a:fld id="{9860DD9F-B9F0-9442-B928-14853C54059E}" type="datetimeFigureOut">
               <a:rPr kumimoji="1" lang="zh-CN" altLang="en-US" smtClean="0"/>
-              <a:t>2020/2/11</a:t>
+              <a:t>2020/2/12</a:t>
             </a:fld>
             <a:endParaRPr kumimoji="1" lang="zh-CN" altLang="en-US"/>
           </a:p>
@@ -788,7 +789,7 @@
           <a:p>
             <a:fld id="{9860DD9F-B9F0-9442-B928-14853C54059E}" type="datetimeFigureOut">
               <a:rPr kumimoji="1" lang="zh-CN" altLang="en-US" smtClean="0"/>
-              <a:t>2020/2/11</a:t>
+              <a:t>2020/2/12</a:t>
             </a:fld>
             <a:endParaRPr kumimoji="1" lang="zh-CN" altLang="en-US"/>
           </a:p>
@@ -1066,7 +1067,7 @@
           <a:p>
             <a:fld id="{9860DD9F-B9F0-9442-B928-14853C54059E}" type="datetimeFigureOut">
               <a:rPr kumimoji="1" lang="zh-CN" altLang="en-US" smtClean="0"/>
-              <a:t>2020/2/11</a:t>
+              <a:t>2020/2/12</a:t>
             </a:fld>
             <a:endParaRPr kumimoji="1" lang="zh-CN" altLang="en-US"/>
           </a:p>
@@ -1281,7 +1282,7 @@
           <a:p>
             <a:fld id="{9860DD9F-B9F0-9442-B928-14853C54059E}" type="datetimeFigureOut">
               <a:rPr kumimoji="1" lang="zh-CN" altLang="en-US" smtClean="0"/>
-              <a:t>2020/2/11</a:t>
+              <a:t>2020/2/12</a:t>
             </a:fld>
             <a:endParaRPr kumimoji="1" lang="zh-CN" altLang="en-US"/>
           </a:p>
@@ -1649,7 +1650,7 @@
           <a:p>
             <a:fld id="{9860DD9F-B9F0-9442-B928-14853C54059E}" type="datetimeFigureOut">
               <a:rPr kumimoji="1" lang="zh-CN" altLang="en-US" smtClean="0"/>
-              <a:t>2020/2/11</a:t>
+              <a:t>2020/2/12</a:t>
             </a:fld>
             <a:endParaRPr kumimoji="1" lang="zh-CN" altLang="en-US"/>
           </a:p>
@@ -1790,7 +1791,7 @@
           <a:p>
             <a:fld id="{9860DD9F-B9F0-9442-B928-14853C54059E}" type="datetimeFigureOut">
               <a:rPr kumimoji="1" lang="zh-CN" altLang="en-US" smtClean="0"/>
-              <a:t>2020/2/11</a:t>
+              <a:t>2020/2/12</a:t>
             </a:fld>
             <a:endParaRPr kumimoji="1" lang="zh-CN" altLang="en-US"/>
           </a:p>
@@ -1903,7 +1904,7 @@
           <a:p>
             <a:fld id="{9860DD9F-B9F0-9442-B928-14853C54059E}" type="datetimeFigureOut">
               <a:rPr kumimoji="1" lang="zh-CN" altLang="en-US" smtClean="0"/>
-              <a:t>2020/2/11</a:t>
+              <a:t>2020/2/12</a:t>
             </a:fld>
             <a:endParaRPr kumimoji="1" lang="zh-CN" altLang="en-US"/>
           </a:p>
@@ -2192,7 +2193,7 @@
           <a:p>
             <a:fld id="{9860DD9F-B9F0-9442-B928-14853C54059E}" type="datetimeFigureOut">
               <a:rPr kumimoji="1" lang="zh-CN" altLang="en-US" smtClean="0"/>
-              <a:t>2020/2/11</a:t>
+              <a:t>2020/2/12</a:t>
             </a:fld>
             <a:endParaRPr kumimoji="1" lang="zh-CN" altLang="en-US"/>
           </a:p>
@@ -2483,7 +2484,7 @@
           <a:p>
             <a:fld id="{9860DD9F-B9F0-9442-B928-14853C54059E}" type="datetimeFigureOut">
               <a:rPr kumimoji="1" lang="zh-CN" altLang="en-US" smtClean="0"/>
-              <a:t>2020/2/11</a:t>
+              <a:t>2020/2/12</a:t>
             </a:fld>
             <a:endParaRPr kumimoji="1" lang="zh-CN" altLang="en-US"/>
           </a:p>
@@ -2699,7 +2700,7 @@
           <a:p>
             <a:fld id="{9860DD9F-B9F0-9442-B928-14853C54059E}" type="datetimeFigureOut">
               <a:rPr kumimoji="1" lang="zh-CN" altLang="en-US" smtClean="0"/>
-              <a:t>2020/2/11</a:t>
+              <a:t>2020/2/12</a:t>
             </a:fld>
             <a:endParaRPr kumimoji="1" lang="zh-CN" altLang="en-US"/>
           </a:p>
@@ -3219,6 +3220,126 @@
 </p:sld>
 </file>
 
+<file path=ppt/slides/slide2.xml><?xml version="1.0" encoding="utf-8"?>
+<p:sld xmlns:a="http://schemas.openxmlformats.org/drawingml/2006/main" xmlns:r="http://schemas.openxmlformats.org/officeDocument/2006/relationships" xmlns:p="http://schemas.openxmlformats.org/presentationml/2006/main">
+  <p:cSld>
+    <p:spTree>
+      <p:nvGrpSpPr>
+        <p:cNvPr id="1" name=""/>
+        <p:cNvGrpSpPr/>
+        <p:nvPr/>
+      </p:nvGrpSpPr>
+      <p:grpSpPr>
+        <a:xfrm>
+          <a:off x="0" y="0"/>
+          <a:ext cx="0" cy="0"/>
+          <a:chOff x="0" y="0"/>
+          <a:chExt cx="0" cy="0"/>
+        </a:xfrm>
+      </p:grpSpPr>
+      <p:pic>
+        <p:nvPicPr>
+          <p:cNvPr id="4" name="图片 3">
+            <a:extLst>
+              <a:ext uri="{FF2B5EF4-FFF2-40B4-BE49-F238E27FC236}">
+                <a16:creationId xmlns:a16="http://schemas.microsoft.com/office/drawing/2014/main" id="{7D1D7418-F35D-EE4B-B884-456753EFF1AF}"/>
+              </a:ext>
+            </a:extLst>
+          </p:cNvPr>
+          <p:cNvPicPr>
+            <a:picLocks noChangeAspect="1"/>
+          </p:cNvPicPr>
+          <p:nvPr/>
+        </p:nvPicPr>
+        <p:blipFill>
+          <a:blip r:embed="rId2"/>
+          <a:stretch>
+            <a:fillRect/>
+          </a:stretch>
+        </p:blipFill>
+        <p:spPr>
+          <a:xfrm>
+            <a:off x="6470130" y="1530350"/>
+            <a:ext cx="5676900" cy="3797300"/>
+          </a:xfrm>
+          <a:prstGeom prst="rect">
+            <a:avLst/>
+          </a:prstGeom>
+        </p:spPr>
+      </p:pic>
+      <p:pic>
+        <p:nvPicPr>
+          <p:cNvPr id="5" name="图片 4">
+            <a:extLst>
+              <a:ext uri="{FF2B5EF4-FFF2-40B4-BE49-F238E27FC236}">
+                <a16:creationId xmlns:a16="http://schemas.microsoft.com/office/drawing/2014/main" id="{1F40FC6A-94D5-F14D-ADF3-52929235073C}"/>
+              </a:ext>
+            </a:extLst>
+          </p:cNvPr>
+          <p:cNvPicPr>
+            <a:picLocks noChangeAspect="1"/>
+          </p:cNvPicPr>
+          <p:nvPr/>
+        </p:nvPicPr>
+        <p:blipFill>
+          <a:blip r:embed="rId3"/>
+          <a:stretch>
+            <a:fillRect/>
+          </a:stretch>
+        </p:blipFill>
+        <p:spPr>
+          <a:xfrm>
+            <a:off x="542039" y="1259174"/>
+            <a:ext cx="1931337" cy="4103621"/>
+          </a:xfrm>
+          <a:prstGeom prst="rect">
+            <a:avLst/>
+          </a:prstGeom>
+        </p:spPr>
+      </p:pic>
+      <p:pic>
+        <p:nvPicPr>
+          <p:cNvPr id="6" name="图片 5">
+            <a:extLst>
+              <a:ext uri="{FF2B5EF4-FFF2-40B4-BE49-F238E27FC236}">
+                <a16:creationId xmlns:a16="http://schemas.microsoft.com/office/drawing/2014/main" id="{507DD989-D54D-1640-A583-F2CC1F51682E}"/>
+              </a:ext>
+            </a:extLst>
+          </p:cNvPr>
+          <p:cNvPicPr>
+            <a:picLocks noChangeAspect="1"/>
+          </p:cNvPicPr>
+          <p:nvPr/>
+        </p:nvPicPr>
+        <p:blipFill>
+          <a:blip r:embed="rId4"/>
+          <a:stretch>
+            <a:fillRect/>
+          </a:stretch>
+        </p:blipFill>
+        <p:spPr>
+          <a:xfrm>
+            <a:off x="2631400" y="2438400"/>
+            <a:ext cx="3733800" cy="1981200"/>
+          </a:xfrm>
+          <a:prstGeom prst="rect">
+            <a:avLst/>
+          </a:prstGeom>
+        </p:spPr>
+      </p:pic>
+    </p:spTree>
+    <p:extLst>
+      <p:ext uri="{BB962C8B-B14F-4D97-AF65-F5344CB8AC3E}">
+        <p14:creationId xmlns:p14="http://schemas.microsoft.com/office/powerpoint/2010/main" val="2098949387"/>
+      </p:ext>
+    </p:extLst>
+  </p:cSld>
+  <p:clrMapOvr>
+    <a:masterClrMapping/>
+  </p:clrMapOvr>
+</p:sld>
+</file>
+
 <file path=ppt/theme/theme1.xml><?xml version="1.0" encoding="utf-8"?>
 <a:theme xmlns:a="http://schemas.openxmlformats.org/drawingml/2006/main" name="Office 主题​​">
   <a:themeElements>

</xml_diff>

<commit_message>
Thu Feb 13 20:39:19 CST 2020
</commit_message>
<xml_diff>
--- a/LaTeX/MacOs系统/figure/all_figures.pptx
+++ b/LaTeX/MacOs系统/figure/all_figures.pptx
@@ -7,6 +7,7 @@
   <p:sldIdLst>
     <p:sldId id="256" r:id="rId2"/>
     <p:sldId id="257" r:id="rId3"/>
+    <p:sldId id="258" r:id="rId4"/>
   </p:sldIdLst>
   <p:sldSz cx="12192000" cy="6858000"/>
   <p:notesSz cx="6858000" cy="9144000"/>
@@ -260,7 +261,7 @@
           <a:p>
             <a:fld id="{9860DD9F-B9F0-9442-B928-14853C54059E}" type="datetimeFigureOut">
               <a:rPr kumimoji="1" lang="zh-CN" altLang="en-US" smtClean="0"/>
-              <a:t>2020/2/12</a:t>
+              <a:t>2020/2/13</a:t>
             </a:fld>
             <a:endParaRPr kumimoji="1" lang="zh-CN" altLang="en-US"/>
           </a:p>
@@ -433,7 +434,7 @@
           <a:p>
             <a:fld id="{9860DD9F-B9F0-9442-B928-14853C54059E}" type="datetimeFigureOut">
               <a:rPr kumimoji="1" lang="zh-CN" altLang="en-US" smtClean="0"/>
-              <a:t>2020/2/12</a:t>
+              <a:t>2020/2/13</a:t>
             </a:fld>
             <a:endParaRPr kumimoji="1" lang="zh-CN" altLang="en-US"/>
           </a:p>
@@ -616,7 +617,7 @@
           <a:p>
             <a:fld id="{9860DD9F-B9F0-9442-B928-14853C54059E}" type="datetimeFigureOut">
               <a:rPr kumimoji="1" lang="zh-CN" altLang="en-US" smtClean="0"/>
-              <a:t>2020/2/12</a:t>
+              <a:t>2020/2/13</a:t>
             </a:fld>
             <a:endParaRPr kumimoji="1" lang="zh-CN" altLang="en-US"/>
           </a:p>
@@ -789,7 +790,7 @@
           <a:p>
             <a:fld id="{9860DD9F-B9F0-9442-B928-14853C54059E}" type="datetimeFigureOut">
               <a:rPr kumimoji="1" lang="zh-CN" altLang="en-US" smtClean="0"/>
-              <a:t>2020/2/12</a:t>
+              <a:t>2020/2/13</a:t>
             </a:fld>
             <a:endParaRPr kumimoji="1" lang="zh-CN" altLang="en-US"/>
           </a:p>
@@ -1067,7 +1068,7 @@
           <a:p>
             <a:fld id="{9860DD9F-B9F0-9442-B928-14853C54059E}" type="datetimeFigureOut">
               <a:rPr kumimoji="1" lang="zh-CN" altLang="en-US" smtClean="0"/>
-              <a:t>2020/2/12</a:t>
+              <a:t>2020/2/13</a:t>
             </a:fld>
             <a:endParaRPr kumimoji="1" lang="zh-CN" altLang="en-US"/>
           </a:p>
@@ -1282,7 +1283,7 @@
           <a:p>
             <a:fld id="{9860DD9F-B9F0-9442-B928-14853C54059E}" type="datetimeFigureOut">
               <a:rPr kumimoji="1" lang="zh-CN" altLang="en-US" smtClean="0"/>
-              <a:t>2020/2/12</a:t>
+              <a:t>2020/2/13</a:t>
             </a:fld>
             <a:endParaRPr kumimoji="1" lang="zh-CN" altLang="en-US"/>
           </a:p>
@@ -1650,7 +1651,7 @@
           <a:p>
             <a:fld id="{9860DD9F-B9F0-9442-B928-14853C54059E}" type="datetimeFigureOut">
               <a:rPr kumimoji="1" lang="zh-CN" altLang="en-US" smtClean="0"/>
-              <a:t>2020/2/12</a:t>
+              <a:t>2020/2/13</a:t>
             </a:fld>
             <a:endParaRPr kumimoji="1" lang="zh-CN" altLang="en-US"/>
           </a:p>
@@ -1791,7 +1792,7 @@
           <a:p>
             <a:fld id="{9860DD9F-B9F0-9442-B928-14853C54059E}" type="datetimeFigureOut">
               <a:rPr kumimoji="1" lang="zh-CN" altLang="en-US" smtClean="0"/>
-              <a:t>2020/2/12</a:t>
+              <a:t>2020/2/13</a:t>
             </a:fld>
             <a:endParaRPr kumimoji="1" lang="zh-CN" altLang="en-US"/>
           </a:p>
@@ -1904,7 +1905,7 @@
           <a:p>
             <a:fld id="{9860DD9F-B9F0-9442-B928-14853C54059E}" type="datetimeFigureOut">
               <a:rPr kumimoji="1" lang="zh-CN" altLang="en-US" smtClean="0"/>
-              <a:t>2020/2/12</a:t>
+              <a:t>2020/2/13</a:t>
             </a:fld>
             <a:endParaRPr kumimoji="1" lang="zh-CN" altLang="en-US"/>
           </a:p>
@@ -2193,7 +2194,7 @@
           <a:p>
             <a:fld id="{9860DD9F-B9F0-9442-B928-14853C54059E}" type="datetimeFigureOut">
               <a:rPr kumimoji="1" lang="zh-CN" altLang="en-US" smtClean="0"/>
-              <a:t>2020/2/12</a:t>
+              <a:t>2020/2/13</a:t>
             </a:fld>
             <a:endParaRPr kumimoji="1" lang="zh-CN" altLang="en-US"/>
           </a:p>
@@ -2484,7 +2485,7 @@
           <a:p>
             <a:fld id="{9860DD9F-B9F0-9442-B928-14853C54059E}" type="datetimeFigureOut">
               <a:rPr kumimoji="1" lang="zh-CN" altLang="en-US" smtClean="0"/>
-              <a:t>2020/2/12</a:t>
+              <a:t>2020/2/13</a:t>
             </a:fld>
             <a:endParaRPr kumimoji="1" lang="zh-CN" altLang="en-US"/>
           </a:p>
@@ -2700,7 +2701,7 @@
           <a:p>
             <a:fld id="{9860DD9F-B9F0-9442-B928-14853C54059E}" type="datetimeFigureOut">
               <a:rPr kumimoji="1" lang="zh-CN" altLang="en-US" smtClean="0"/>
-              <a:t>2020/2/12</a:t>
+              <a:t>2020/2/13</a:t>
             </a:fld>
             <a:endParaRPr kumimoji="1" lang="zh-CN" altLang="en-US"/>
           </a:p>
@@ -3340,6 +3341,276 @@
 </p:sld>
 </file>
 
+<file path=ppt/slides/slide3.xml><?xml version="1.0" encoding="utf-8"?>
+<p:sld xmlns:a="http://schemas.openxmlformats.org/drawingml/2006/main" xmlns:r="http://schemas.openxmlformats.org/officeDocument/2006/relationships" xmlns:p="http://schemas.openxmlformats.org/presentationml/2006/main">
+  <p:cSld>
+    <p:spTree>
+      <p:nvGrpSpPr>
+        <p:cNvPr id="1" name=""/>
+        <p:cNvGrpSpPr/>
+        <p:nvPr/>
+      </p:nvGrpSpPr>
+      <p:grpSpPr>
+        <a:xfrm>
+          <a:off x="0" y="0"/>
+          <a:ext cx="0" cy="0"/>
+          <a:chOff x="0" y="0"/>
+          <a:chExt cx="0" cy="0"/>
+        </a:xfrm>
+      </p:grpSpPr>
+      <p:pic>
+        <p:nvPicPr>
+          <p:cNvPr id="6" name="图片 5">
+            <a:extLst>
+              <a:ext uri="{FF2B5EF4-FFF2-40B4-BE49-F238E27FC236}">
+                <a16:creationId xmlns:a16="http://schemas.microsoft.com/office/drawing/2014/main" id="{E42D647A-AE72-AF4E-BA1C-4946A769829E}"/>
+              </a:ext>
+            </a:extLst>
+          </p:cNvPr>
+          <p:cNvPicPr>
+            <a:picLocks noChangeAspect="1"/>
+          </p:cNvPicPr>
+          <p:nvPr/>
+        </p:nvPicPr>
+        <p:blipFill>
+          <a:blip r:embed="rId2"/>
+          <a:stretch>
+            <a:fillRect/>
+          </a:stretch>
+        </p:blipFill>
+        <p:spPr>
+          <a:xfrm>
+            <a:off x="3452005" y="2110500"/>
+            <a:ext cx="1135961" cy="1126800"/>
+          </a:xfrm>
+          <a:prstGeom prst="rect">
+            <a:avLst/>
+          </a:prstGeom>
+        </p:spPr>
+      </p:pic>
+      <p:pic>
+        <p:nvPicPr>
+          <p:cNvPr id="9" name="图片 8">
+            <a:extLst>
+              <a:ext uri="{FF2B5EF4-FFF2-40B4-BE49-F238E27FC236}">
+                <a16:creationId xmlns:a16="http://schemas.microsoft.com/office/drawing/2014/main" id="{66CA7E9C-23D1-FA43-B1E4-1B4073BBD27B}"/>
+              </a:ext>
+            </a:extLst>
+          </p:cNvPr>
+          <p:cNvPicPr>
+            <a:picLocks noChangeAspect="1"/>
+          </p:cNvPicPr>
+          <p:nvPr/>
+        </p:nvPicPr>
+        <p:blipFill>
+          <a:blip r:embed="rId3"/>
+          <a:stretch>
+            <a:fillRect/>
+          </a:stretch>
+        </p:blipFill>
+        <p:spPr>
+          <a:xfrm>
+            <a:off x="3443744" y="3215950"/>
+            <a:ext cx="1144694" cy="1126800"/>
+          </a:xfrm>
+          <a:prstGeom prst="rect">
+            <a:avLst/>
+          </a:prstGeom>
+        </p:spPr>
+      </p:pic>
+      <p:pic>
+        <p:nvPicPr>
+          <p:cNvPr id="10" name="图片 9">
+            <a:extLst>
+              <a:ext uri="{FF2B5EF4-FFF2-40B4-BE49-F238E27FC236}">
+                <a16:creationId xmlns:a16="http://schemas.microsoft.com/office/drawing/2014/main" id="{64DC1720-CC5B-F244-B9AC-B1E5DDBA397A}"/>
+              </a:ext>
+            </a:extLst>
+          </p:cNvPr>
+          <p:cNvPicPr>
+            <a:picLocks noChangeAspect="1"/>
+          </p:cNvPicPr>
+          <p:nvPr/>
+        </p:nvPicPr>
+        <p:blipFill>
+          <a:blip r:embed="rId4"/>
+          <a:stretch>
+            <a:fillRect/>
+          </a:stretch>
+        </p:blipFill>
+        <p:spPr>
+          <a:xfrm>
+            <a:off x="4586731" y="2105958"/>
+            <a:ext cx="1145272" cy="1126800"/>
+          </a:xfrm>
+          <a:prstGeom prst="rect">
+            <a:avLst/>
+          </a:prstGeom>
+        </p:spPr>
+      </p:pic>
+      <p:pic>
+        <p:nvPicPr>
+          <p:cNvPr id="11" name="图片 10">
+            <a:extLst>
+              <a:ext uri="{FF2B5EF4-FFF2-40B4-BE49-F238E27FC236}">
+                <a16:creationId xmlns:a16="http://schemas.microsoft.com/office/drawing/2014/main" id="{D46F51E3-3A64-9F44-852E-DAF857F72D1E}"/>
+              </a:ext>
+            </a:extLst>
+          </p:cNvPr>
+          <p:cNvPicPr>
+            <a:picLocks noChangeAspect="1"/>
+          </p:cNvPicPr>
+          <p:nvPr/>
+        </p:nvPicPr>
+        <p:blipFill>
+          <a:blip r:embed="rId5"/>
+          <a:stretch>
+            <a:fillRect/>
+          </a:stretch>
+        </p:blipFill>
+        <p:spPr>
+          <a:xfrm>
+            <a:off x="4588437" y="3229062"/>
+            <a:ext cx="1145271" cy="1126800"/>
+          </a:xfrm>
+          <a:prstGeom prst="rect">
+            <a:avLst/>
+          </a:prstGeom>
+        </p:spPr>
+      </p:pic>
+      <p:pic>
+        <p:nvPicPr>
+          <p:cNvPr id="13" name="图片 12">
+            <a:extLst>
+              <a:ext uri="{FF2B5EF4-FFF2-40B4-BE49-F238E27FC236}">
+                <a16:creationId xmlns:a16="http://schemas.microsoft.com/office/drawing/2014/main" id="{6206F4AE-1E6E-0245-9D61-95F85F1C5E27}"/>
+              </a:ext>
+            </a:extLst>
+          </p:cNvPr>
+          <p:cNvPicPr>
+            <a:picLocks noChangeAspect="1"/>
+          </p:cNvPicPr>
+          <p:nvPr/>
+        </p:nvPicPr>
+        <p:blipFill>
+          <a:blip r:embed="rId6"/>
+          <a:stretch>
+            <a:fillRect/>
+          </a:stretch>
+        </p:blipFill>
+        <p:spPr>
+          <a:xfrm>
+            <a:off x="5903819" y="2110500"/>
+            <a:ext cx="1126800" cy="1126800"/>
+          </a:xfrm>
+          <a:prstGeom prst="rect">
+            <a:avLst/>
+          </a:prstGeom>
+        </p:spPr>
+      </p:pic>
+      <p:pic>
+        <p:nvPicPr>
+          <p:cNvPr id="14" name="图片 13">
+            <a:extLst>
+              <a:ext uri="{FF2B5EF4-FFF2-40B4-BE49-F238E27FC236}">
+                <a16:creationId xmlns:a16="http://schemas.microsoft.com/office/drawing/2014/main" id="{A2E74022-1DC6-A642-ADAC-907835BB79DF}"/>
+              </a:ext>
+            </a:extLst>
+          </p:cNvPr>
+          <p:cNvPicPr>
+            <a:picLocks noChangeAspect="1"/>
+          </p:cNvPicPr>
+          <p:nvPr/>
+        </p:nvPicPr>
+        <p:blipFill>
+          <a:blip r:embed="rId7"/>
+          <a:stretch>
+            <a:fillRect/>
+          </a:stretch>
+        </p:blipFill>
+        <p:spPr>
+          <a:xfrm>
+            <a:off x="5876111" y="3215950"/>
+            <a:ext cx="1155086" cy="1139912"/>
+          </a:xfrm>
+          <a:prstGeom prst="rect">
+            <a:avLst/>
+          </a:prstGeom>
+        </p:spPr>
+      </p:pic>
+      <p:pic>
+        <p:nvPicPr>
+          <p:cNvPr id="15" name="图片 14">
+            <a:extLst>
+              <a:ext uri="{FF2B5EF4-FFF2-40B4-BE49-F238E27FC236}">
+                <a16:creationId xmlns:a16="http://schemas.microsoft.com/office/drawing/2014/main" id="{057326E3-63FB-2A4C-8EC0-2367BB17069C}"/>
+              </a:ext>
+            </a:extLst>
+          </p:cNvPr>
+          <p:cNvPicPr>
+            <a:picLocks noChangeAspect="1"/>
+          </p:cNvPicPr>
+          <p:nvPr/>
+        </p:nvPicPr>
+        <p:blipFill>
+          <a:blip r:embed="rId8"/>
+          <a:stretch>
+            <a:fillRect/>
+          </a:stretch>
+        </p:blipFill>
+        <p:spPr>
+          <a:xfrm>
+            <a:off x="7023919" y="2090386"/>
+            <a:ext cx="1126800" cy="1126800"/>
+          </a:xfrm>
+          <a:prstGeom prst="rect">
+            <a:avLst/>
+          </a:prstGeom>
+        </p:spPr>
+      </p:pic>
+      <p:pic>
+        <p:nvPicPr>
+          <p:cNvPr id="16" name="图片 15">
+            <a:extLst>
+              <a:ext uri="{FF2B5EF4-FFF2-40B4-BE49-F238E27FC236}">
+                <a16:creationId xmlns:a16="http://schemas.microsoft.com/office/drawing/2014/main" id="{B21DCC1A-1542-BD4E-9233-C9008670184D}"/>
+              </a:ext>
+            </a:extLst>
+          </p:cNvPr>
+          <p:cNvPicPr>
+            <a:picLocks noChangeAspect="1"/>
+          </p:cNvPicPr>
+          <p:nvPr/>
+        </p:nvPicPr>
+        <p:blipFill>
+          <a:blip r:embed="rId9"/>
+          <a:stretch>
+            <a:fillRect/>
+          </a:stretch>
+        </p:blipFill>
+        <p:spPr>
+          <a:xfrm>
+            <a:off x="7019917" y="3215950"/>
+            <a:ext cx="1139269" cy="1148400"/>
+          </a:xfrm>
+          <a:prstGeom prst="rect">
+            <a:avLst/>
+          </a:prstGeom>
+        </p:spPr>
+      </p:pic>
+    </p:spTree>
+    <p:extLst>
+      <p:ext uri="{BB962C8B-B14F-4D97-AF65-F5344CB8AC3E}">
+        <p14:creationId xmlns:p14="http://schemas.microsoft.com/office/powerpoint/2010/main" val="3669084980"/>
+      </p:ext>
+    </p:extLst>
+  </p:cSld>
+  <p:clrMapOvr>
+    <a:masterClrMapping/>
+  </p:clrMapOvr>
+</p:sld>
+</file>
+
 <file path=ppt/theme/theme1.xml><?xml version="1.0" encoding="utf-8"?>
 <a:theme xmlns:a="http://schemas.openxmlformats.org/drawingml/2006/main" name="Office 主题​​">
   <a:themeElements>

</xml_diff>

<commit_message>
Sat Feb 22 21:14:32 CST 2020
</commit_message>
<xml_diff>
--- a/LaTeX/MacOs系统/figure/all_figures.pptx
+++ b/LaTeX/MacOs系统/figure/all_figures.pptx
@@ -5,7 +5,7 @@
     <p:sldMasterId id="2147483660" r:id="rId1"/>
   </p:sldMasterIdLst>
   <p:notesMasterIdLst>
-    <p:notesMasterId r:id="rId12"/>
+    <p:notesMasterId r:id="rId14"/>
   </p:notesMasterIdLst>
   <p:sldIdLst>
     <p:sldId id="256" r:id="rId2"/>
@@ -18,6 +18,8 @@
     <p:sldId id="401" r:id="rId9"/>
     <p:sldId id="402" r:id="rId10"/>
     <p:sldId id="403" r:id="rId11"/>
+    <p:sldId id="404" r:id="rId12"/>
+    <p:sldId id="405" r:id="rId13"/>
   </p:sldIdLst>
   <p:sldSz cx="12192000" cy="7937500"/>
   <p:notesSz cx="6858000" cy="9144000"/>
@@ -206,7 +208,7 @@
           <a:p>
             <a:fld id="{D2A48B96-639E-45A3-A0BA-2464DFDB1FAA}" type="datetimeFigureOut">
               <a:rPr lang="zh-CN" altLang="en-US" smtClean="0"/>
-              <a:t>2020/2/20</a:t>
+              <a:t>2020/2/22</a:t>
             </a:fld>
             <a:endParaRPr lang="zh-CN" altLang="en-US"/>
           </a:p>
@@ -1201,7 +1203,7 @@
           <a:p>
             <a:fld id="{9860DD9F-B9F0-9442-B928-14853C54059E}" type="datetimeFigureOut">
               <a:rPr kumimoji="1" lang="zh-CN" altLang="en-US" smtClean="0"/>
-              <a:t>2020/2/20</a:t>
+              <a:t>2020/2/22</a:t>
             </a:fld>
             <a:endParaRPr kumimoji="1" lang="zh-CN" altLang="en-US"/>
           </a:p>
@@ -1347,7 +1349,7 @@
           <a:p>
             <a:fld id="{9860DD9F-B9F0-9442-B928-14853C54059E}" type="datetimeFigureOut">
               <a:rPr kumimoji="1" lang="zh-CN" altLang="en-US" smtClean="0"/>
-              <a:t>2020/2/20</a:t>
+              <a:t>2020/2/22</a:t>
             </a:fld>
             <a:endParaRPr kumimoji="1" lang="zh-CN" altLang="en-US"/>
           </a:p>
@@ -1503,7 +1505,7 @@
           <a:p>
             <a:fld id="{9860DD9F-B9F0-9442-B928-14853C54059E}" type="datetimeFigureOut">
               <a:rPr kumimoji="1" lang="zh-CN" altLang="en-US" smtClean="0"/>
-              <a:t>2020/2/20</a:t>
+              <a:t>2020/2/22</a:t>
             </a:fld>
             <a:endParaRPr kumimoji="1" lang="zh-CN" altLang="en-US"/>
           </a:p>
@@ -1649,7 +1651,7 @@
           <a:p>
             <a:fld id="{9860DD9F-B9F0-9442-B928-14853C54059E}" type="datetimeFigureOut">
               <a:rPr kumimoji="1" lang="zh-CN" altLang="en-US" smtClean="0"/>
-              <a:t>2020/2/20</a:t>
+              <a:t>2020/2/22</a:t>
             </a:fld>
             <a:endParaRPr kumimoji="1" lang="zh-CN" altLang="en-US"/>
           </a:p>
@@ -1898,7 +1900,7 @@
           <a:p>
             <a:fld id="{9860DD9F-B9F0-9442-B928-14853C54059E}" type="datetimeFigureOut">
               <a:rPr kumimoji="1" lang="zh-CN" altLang="en-US" smtClean="0"/>
-              <a:t>2020/2/20</a:t>
+              <a:t>2020/2/22</a:t>
             </a:fld>
             <a:endParaRPr kumimoji="1" lang="zh-CN" altLang="en-US"/>
           </a:p>
@@ -2082,7 +2084,7 @@
           <a:p>
             <a:fld id="{9860DD9F-B9F0-9442-B928-14853C54059E}" type="datetimeFigureOut">
               <a:rPr kumimoji="1" lang="zh-CN" altLang="en-US" smtClean="0"/>
-              <a:t>2020/2/20</a:t>
+              <a:t>2020/2/22</a:t>
             </a:fld>
             <a:endParaRPr kumimoji="1" lang="zh-CN" altLang="en-US"/>
           </a:p>
@@ -2411,7 +2413,7 @@
           <a:p>
             <a:fld id="{9860DD9F-B9F0-9442-B928-14853C54059E}" type="datetimeFigureOut">
               <a:rPr kumimoji="1" lang="zh-CN" altLang="en-US" smtClean="0"/>
-              <a:t>2020/2/20</a:t>
+              <a:t>2020/2/22</a:t>
             </a:fld>
             <a:endParaRPr kumimoji="1" lang="zh-CN" altLang="en-US"/>
           </a:p>
@@ -2529,7 +2531,7 @@
           <a:p>
             <a:fld id="{9860DD9F-B9F0-9442-B928-14853C54059E}" type="datetimeFigureOut">
               <a:rPr kumimoji="1" lang="zh-CN" altLang="en-US" smtClean="0"/>
-              <a:t>2020/2/20</a:t>
+              <a:t>2020/2/22</a:t>
             </a:fld>
             <a:endParaRPr kumimoji="1" lang="zh-CN" altLang="en-US"/>
           </a:p>
@@ -2624,7 +2626,7 @@
           <a:p>
             <a:fld id="{9860DD9F-B9F0-9442-B928-14853C54059E}" type="datetimeFigureOut">
               <a:rPr kumimoji="1" lang="zh-CN" altLang="en-US" smtClean="0"/>
-              <a:t>2020/2/20</a:t>
+              <a:t>2020/2/22</a:t>
             </a:fld>
             <a:endParaRPr kumimoji="1" lang="zh-CN" altLang="en-US"/>
           </a:p>
@@ -2882,7 +2884,7 @@
           <a:p>
             <a:fld id="{9860DD9F-B9F0-9442-B928-14853C54059E}" type="datetimeFigureOut">
               <a:rPr kumimoji="1" lang="zh-CN" altLang="en-US" smtClean="0"/>
-              <a:t>2020/2/20</a:t>
+              <a:t>2020/2/22</a:t>
             </a:fld>
             <a:endParaRPr kumimoji="1" lang="zh-CN" altLang="en-US"/>
           </a:p>
@@ -3144,7 +3146,7 @@
           <a:p>
             <a:fld id="{9860DD9F-B9F0-9442-B928-14853C54059E}" type="datetimeFigureOut">
               <a:rPr kumimoji="1" lang="zh-CN" altLang="en-US" smtClean="0"/>
-              <a:t>2020/2/20</a:t>
+              <a:t>2020/2/22</a:t>
             </a:fld>
             <a:endParaRPr kumimoji="1" lang="zh-CN" altLang="en-US"/>
           </a:p>
@@ -3333,7 +3335,7 @@
           <a:p>
             <a:fld id="{9860DD9F-B9F0-9442-B928-14853C54059E}" type="datetimeFigureOut">
               <a:rPr kumimoji="1" lang="zh-CN" altLang="en-US" smtClean="0"/>
-              <a:t>2020/2/20</a:t>
+              <a:t>2020/2/22</a:t>
             </a:fld>
             <a:endParaRPr kumimoji="1" lang="zh-CN" altLang="en-US"/>
           </a:p>
@@ -4534,6 +4536,1774 @@
 </p:sld>
 </file>
 
+<file path=ppt/slides/slide11.xml><?xml version="1.0" encoding="utf-8"?>
+<p:sld xmlns:a="http://schemas.openxmlformats.org/drawingml/2006/main" xmlns:r="http://schemas.openxmlformats.org/officeDocument/2006/relationships" xmlns:p="http://schemas.openxmlformats.org/presentationml/2006/main">
+  <p:cSld>
+    <p:spTree>
+      <p:nvGrpSpPr>
+        <p:cNvPr id="1" name=""/>
+        <p:cNvGrpSpPr/>
+        <p:nvPr/>
+      </p:nvGrpSpPr>
+      <p:grpSpPr>
+        <a:xfrm>
+          <a:off x="0" y="0"/>
+          <a:ext cx="0" cy="0"/>
+          <a:chOff x="0" y="0"/>
+          <a:chExt cx="0" cy="0"/>
+        </a:xfrm>
+      </p:grpSpPr>
+      <p:pic>
+        <p:nvPicPr>
+          <p:cNvPr id="5" name="图片 4">
+            <a:extLst>
+              <a:ext uri="{FF2B5EF4-FFF2-40B4-BE49-F238E27FC236}">
+                <a16:creationId xmlns:a16="http://schemas.microsoft.com/office/drawing/2014/main" id="{AD6F71B3-E4C2-444B-8B3E-F3AB3D5FCE61}"/>
+              </a:ext>
+            </a:extLst>
+          </p:cNvPr>
+          <p:cNvPicPr>
+            <a:picLocks noChangeAspect="1"/>
+          </p:cNvPicPr>
+          <p:nvPr/>
+        </p:nvPicPr>
+        <p:blipFill>
+          <a:blip r:embed="rId2"/>
+          <a:stretch>
+            <a:fillRect/>
+          </a:stretch>
+        </p:blipFill>
+        <p:spPr>
+          <a:xfrm>
+            <a:off x="1497163" y="1311814"/>
+            <a:ext cx="812800" cy="812800"/>
+          </a:xfrm>
+          <a:prstGeom prst="rect">
+            <a:avLst/>
+          </a:prstGeom>
+        </p:spPr>
+      </p:pic>
+      <p:pic>
+        <p:nvPicPr>
+          <p:cNvPr id="7" name="图片 6">
+            <a:extLst>
+              <a:ext uri="{FF2B5EF4-FFF2-40B4-BE49-F238E27FC236}">
+                <a16:creationId xmlns:a16="http://schemas.microsoft.com/office/drawing/2014/main" id="{A5744BDB-3467-4242-965C-3A13E4440080}"/>
+              </a:ext>
+            </a:extLst>
+          </p:cNvPr>
+          <p:cNvPicPr>
+            <a:picLocks noChangeAspect="1"/>
+          </p:cNvPicPr>
+          <p:nvPr/>
+        </p:nvPicPr>
+        <p:blipFill>
+          <a:blip r:embed="rId3"/>
+          <a:stretch>
+            <a:fillRect/>
+          </a:stretch>
+        </p:blipFill>
+        <p:spPr>
+          <a:xfrm>
+            <a:off x="1497070" y="3006864"/>
+            <a:ext cx="812800" cy="812800"/>
+          </a:xfrm>
+          <a:prstGeom prst="rect">
+            <a:avLst/>
+          </a:prstGeom>
+        </p:spPr>
+      </p:pic>
+      <p:pic>
+        <p:nvPicPr>
+          <p:cNvPr id="9" name="图片 8">
+            <a:extLst>
+              <a:ext uri="{FF2B5EF4-FFF2-40B4-BE49-F238E27FC236}">
+                <a16:creationId xmlns:a16="http://schemas.microsoft.com/office/drawing/2014/main" id="{8EA2014E-AB20-484B-81AB-2C4476FE791C}"/>
+              </a:ext>
+            </a:extLst>
+          </p:cNvPr>
+          <p:cNvPicPr>
+            <a:picLocks noChangeAspect="1"/>
+          </p:cNvPicPr>
+          <p:nvPr/>
+        </p:nvPicPr>
+        <p:blipFill>
+          <a:blip r:embed="rId4"/>
+          <a:stretch>
+            <a:fillRect/>
+          </a:stretch>
+        </p:blipFill>
+        <p:spPr>
+          <a:xfrm>
+            <a:off x="2362429" y="2159339"/>
+            <a:ext cx="812800" cy="812800"/>
+          </a:xfrm>
+          <a:prstGeom prst="rect">
+            <a:avLst/>
+          </a:prstGeom>
+        </p:spPr>
+      </p:pic>
+      <p:pic>
+        <p:nvPicPr>
+          <p:cNvPr id="11" name="图片 10">
+            <a:extLst>
+              <a:ext uri="{FF2B5EF4-FFF2-40B4-BE49-F238E27FC236}">
+                <a16:creationId xmlns:a16="http://schemas.microsoft.com/office/drawing/2014/main" id="{A447D9D3-F334-1640-B196-9B8C4FA6873A}"/>
+              </a:ext>
+            </a:extLst>
+          </p:cNvPr>
+          <p:cNvPicPr>
+            <a:picLocks noChangeAspect="1"/>
+          </p:cNvPicPr>
+          <p:nvPr/>
+        </p:nvPicPr>
+        <p:blipFill>
+          <a:blip r:embed="rId5"/>
+          <a:stretch>
+            <a:fillRect/>
+          </a:stretch>
+        </p:blipFill>
+        <p:spPr>
+          <a:xfrm>
+            <a:off x="2362429" y="3006864"/>
+            <a:ext cx="812800" cy="812800"/>
+          </a:xfrm>
+          <a:prstGeom prst="rect">
+            <a:avLst/>
+          </a:prstGeom>
+        </p:spPr>
+      </p:pic>
+      <p:pic>
+        <p:nvPicPr>
+          <p:cNvPr id="13" name="图片 12">
+            <a:extLst>
+              <a:ext uri="{FF2B5EF4-FFF2-40B4-BE49-F238E27FC236}">
+                <a16:creationId xmlns:a16="http://schemas.microsoft.com/office/drawing/2014/main" id="{7C4B6ED8-0E1B-3343-9CDC-BD7EAC180E57}"/>
+              </a:ext>
+            </a:extLst>
+          </p:cNvPr>
+          <p:cNvPicPr>
+            <a:picLocks noChangeAspect="1"/>
+          </p:cNvPicPr>
+          <p:nvPr/>
+        </p:nvPicPr>
+        <p:blipFill>
+          <a:blip r:embed="rId6"/>
+          <a:stretch>
+            <a:fillRect/>
+          </a:stretch>
+        </p:blipFill>
+        <p:spPr>
+          <a:xfrm>
+            <a:off x="2362429" y="1311814"/>
+            <a:ext cx="812800" cy="812800"/>
+          </a:xfrm>
+          <a:prstGeom prst="rect">
+            <a:avLst/>
+          </a:prstGeom>
+        </p:spPr>
+      </p:pic>
+      <p:pic>
+        <p:nvPicPr>
+          <p:cNvPr id="15" name="图片 14">
+            <a:extLst>
+              <a:ext uri="{FF2B5EF4-FFF2-40B4-BE49-F238E27FC236}">
+                <a16:creationId xmlns:a16="http://schemas.microsoft.com/office/drawing/2014/main" id="{1BBB1D78-4F23-FD40-B9A4-F0EF08B56539}"/>
+              </a:ext>
+            </a:extLst>
+          </p:cNvPr>
+          <p:cNvPicPr>
+            <a:picLocks noChangeAspect="1"/>
+          </p:cNvPicPr>
+          <p:nvPr/>
+        </p:nvPicPr>
+        <p:blipFill>
+          <a:blip r:embed="rId7"/>
+          <a:stretch>
+            <a:fillRect/>
+          </a:stretch>
+        </p:blipFill>
+        <p:spPr>
+          <a:xfrm>
+            <a:off x="1497070" y="2159339"/>
+            <a:ext cx="812800" cy="812800"/>
+          </a:xfrm>
+          <a:prstGeom prst="rect">
+            <a:avLst/>
+          </a:prstGeom>
+        </p:spPr>
+      </p:pic>
+      <p:pic>
+        <p:nvPicPr>
+          <p:cNvPr id="21" name="图片 20">
+            <a:extLst>
+              <a:ext uri="{FF2B5EF4-FFF2-40B4-BE49-F238E27FC236}">
+                <a16:creationId xmlns:a16="http://schemas.microsoft.com/office/drawing/2014/main" id="{4E95F0D3-3648-054C-AEFE-247F7FF67E5C}"/>
+              </a:ext>
+            </a:extLst>
+          </p:cNvPr>
+          <p:cNvPicPr>
+            <a:picLocks noChangeAspect="1"/>
+          </p:cNvPicPr>
+          <p:nvPr/>
+        </p:nvPicPr>
+        <p:blipFill>
+          <a:blip r:embed="rId8"/>
+          <a:stretch>
+            <a:fillRect/>
+          </a:stretch>
+        </p:blipFill>
+        <p:spPr>
+          <a:xfrm>
+            <a:off x="4155782" y="3006864"/>
+            <a:ext cx="812800" cy="812800"/>
+          </a:xfrm>
+          <a:prstGeom prst="rect">
+            <a:avLst/>
+          </a:prstGeom>
+        </p:spPr>
+      </p:pic>
+      <p:pic>
+        <p:nvPicPr>
+          <p:cNvPr id="23" name="图片 22">
+            <a:extLst>
+              <a:ext uri="{FF2B5EF4-FFF2-40B4-BE49-F238E27FC236}">
+                <a16:creationId xmlns:a16="http://schemas.microsoft.com/office/drawing/2014/main" id="{953AE9D3-0362-6641-A35D-02605A8B8248}"/>
+              </a:ext>
+            </a:extLst>
+          </p:cNvPr>
+          <p:cNvPicPr>
+            <a:picLocks noChangeAspect="1"/>
+          </p:cNvPicPr>
+          <p:nvPr/>
+        </p:nvPicPr>
+        <p:blipFill>
+          <a:blip r:embed="rId9"/>
+          <a:stretch>
+            <a:fillRect/>
+          </a:stretch>
+        </p:blipFill>
+        <p:spPr>
+          <a:xfrm>
+            <a:off x="3304309" y="3006864"/>
+            <a:ext cx="812800" cy="812800"/>
+          </a:xfrm>
+          <a:prstGeom prst="rect">
+            <a:avLst/>
+          </a:prstGeom>
+        </p:spPr>
+      </p:pic>
+      <p:pic>
+        <p:nvPicPr>
+          <p:cNvPr id="25" name="图片 24">
+            <a:extLst>
+              <a:ext uri="{FF2B5EF4-FFF2-40B4-BE49-F238E27FC236}">
+                <a16:creationId xmlns:a16="http://schemas.microsoft.com/office/drawing/2014/main" id="{6516C430-0BA4-4B43-98E1-E8C15296DA70}"/>
+              </a:ext>
+            </a:extLst>
+          </p:cNvPr>
+          <p:cNvPicPr>
+            <a:picLocks noChangeAspect="1"/>
+          </p:cNvPicPr>
+          <p:nvPr/>
+        </p:nvPicPr>
+        <p:blipFill>
+          <a:blip r:embed="rId10"/>
+          <a:stretch>
+            <a:fillRect/>
+          </a:stretch>
+        </p:blipFill>
+        <p:spPr>
+          <a:xfrm>
+            <a:off x="4155782" y="2159339"/>
+            <a:ext cx="812800" cy="812800"/>
+          </a:xfrm>
+          <a:prstGeom prst="rect">
+            <a:avLst/>
+          </a:prstGeom>
+        </p:spPr>
+      </p:pic>
+      <p:pic>
+        <p:nvPicPr>
+          <p:cNvPr id="27" name="图片 26">
+            <a:extLst>
+              <a:ext uri="{FF2B5EF4-FFF2-40B4-BE49-F238E27FC236}">
+                <a16:creationId xmlns:a16="http://schemas.microsoft.com/office/drawing/2014/main" id="{F6450B2D-E478-AC4E-AC9C-890C1AADC92B}"/>
+              </a:ext>
+            </a:extLst>
+          </p:cNvPr>
+          <p:cNvPicPr>
+            <a:picLocks noChangeAspect="1"/>
+          </p:cNvPicPr>
+          <p:nvPr/>
+        </p:nvPicPr>
+        <p:blipFill>
+          <a:blip r:embed="rId11"/>
+          <a:stretch>
+            <a:fillRect/>
+          </a:stretch>
+        </p:blipFill>
+        <p:spPr>
+          <a:xfrm>
+            <a:off x="3304309" y="2159339"/>
+            <a:ext cx="812800" cy="812800"/>
+          </a:xfrm>
+          <a:prstGeom prst="rect">
+            <a:avLst/>
+          </a:prstGeom>
+        </p:spPr>
+      </p:pic>
+      <p:pic>
+        <p:nvPicPr>
+          <p:cNvPr id="29" name="图片 28">
+            <a:extLst>
+              <a:ext uri="{FF2B5EF4-FFF2-40B4-BE49-F238E27FC236}">
+                <a16:creationId xmlns:a16="http://schemas.microsoft.com/office/drawing/2014/main" id="{73D86A7E-4606-3940-8A3A-AEE7A2F4C361}"/>
+              </a:ext>
+            </a:extLst>
+          </p:cNvPr>
+          <p:cNvPicPr>
+            <a:picLocks noChangeAspect="1"/>
+          </p:cNvPicPr>
+          <p:nvPr/>
+        </p:nvPicPr>
+        <p:blipFill>
+          <a:blip r:embed="rId12"/>
+          <a:stretch>
+            <a:fillRect/>
+          </a:stretch>
+        </p:blipFill>
+        <p:spPr>
+          <a:xfrm>
+            <a:off x="4155782" y="1305401"/>
+            <a:ext cx="812800" cy="812800"/>
+          </a:xfrm>
+          <a:prstGeom prst="rect">
+            <a:avLst/>
+          </a:prstGeom>
+        </p:spPr>
+      </p:pic>
+      <p:pic>
+        <p:nvPicPr>
+          <p:cNvPr id="31" name="图片 30">
+            <a:extLst>
+              <a:ext uri="{FF2B5EF4-FFF2-40B4-BE49-F238E27FC236}">
+                <a16:creationId xmlns:a16="http://schemas.microsoft.com/office/drawing/2014/main" id="{BF143F55-6639-9B41-834C-1C067CED8C42}"/>
+              </a:ext>
+            </a:extLst>
+          </p:cNvPr>
+          <p:cNvPicPr>
+            <a:picLocks noChangeAspect="1"/>
+          </p:cNvPicPr>
+          <p:nvPr/>
+        </p:nvPicPr>
+        <p:blipFill>
+          <a:blip r:embed="rId13"/>
+          <a:stretch>
+            <a:fillRect/>
+          </a:stretch>
+        </p:blipFill>
+        <p:spPr>
+          <a:xfrm>
+            <a:off x="3296592" y="1311814"/>
+            <a:ext cx="812800" cy="812800"/>
+          </a:xfrm>
+          <a:prstGeom prst="rect">
+            <a:avLst/>
+          </a:prstGeom>
+        </p:spPr>
+      </p:pic>
+      <p:sp>
+        <p:nvSpPr>
+          <p:cNvPr id="2" name="矩形 1">
+            <a:extLst>
+              <a:ext uri="{FF2B5EF4-FFF2-40B4-BE49-F238E27FC236}">
+                <a16:creationId xmlns:a16="http://schemas.microsoft.com/office/drawing/2014/main" id="{06AC689E-6C8A-2F48-8867-A78F36906529}"/>
+              </a:ext>
+            </a:extLst>
+          </p:cNvPr>
+          <p:cNvSpPr/>
+          <p:nvPr/>
+        </p:nvSpPr>
+        <p:spPr>
+          <a:xfrm>
+            <a:off x="2946400" y="2500778"/>
+            <a:ext cx="177800" cy="158750"/>
+          </a:xfrm>
+          <a:prstGeom prst="rect">
+            <a:avLst/>
+          </a:prstGeom>
+          <a:noFill/>
+          <a:ln w="10160">
+            <a:solidFill>
+              <a:srgbClr val="FF0000"/>
+            </a:solidFill>
+          </a:ln>
+        </p:spPr>
+        <p:style>
+          <a:lnRef idx="2">
+            <a:schemeClr val="accent1">
+              <a:shade val="50000"/>
+            </a:schemeClr>
+          </a:lnRef>
+          <a:fillRef idx="1">
+            <a:schemeClr val="accent1"/>
+          </a:fillRef>
+          <a:effectRef idx="0">
+            <a:schemeClr val="accent1"/>
+          </a:effectRef>
+          <a:fontRef idx="minor">
+            <a:schemeClr val="lt1"/>
+          </a:fontRef>
+        </p:style>
+        <p:txBody>
+          <a:bodyPr rtlCol="0" anchor="ctr"/>
+          <a:lstStyle/>
+          <a:p>
+            <a:pPr algn="ctr"/>
+            <a:endParaRPr kumimoji="1" lang="zh-CN" altLang="en-US" dirty="0"/>
+          </a:p>
+        </p:txBody>
+      </p:sp>
+      <p:sp>
+        <p:nvSpPr>
+          <p:cNvPr id="16" name="矩形 15">
+            <a:extLst>
+              <a:ext uri="{FF2B5EF4-FFF2-40B4-BE49-F238E27FC236}">
+                <a16:creationId xmlns:a16="http://schemas.microsoft.com/office/drawing/2014/main" id="{358C26B5-7B61-894A-B896-C7A6F81237AE}"/>
+              </a:ext>
+            </a:extLst>
+          </p:cNvPr>
+          <p:cNvSpPr/>
+          <p:nvPr/>
+        </p:nvSpPr>
+        <p:spPr>
+          <a:xfrm>
+            <a:off x="2107710" y="3433058"/>
+            <a:ext cx="177800" cy="158750"/>
+          </a:xfrm>
+          <a:prstGeom prst="rect">
+            <a:avLst/>
+          </a:prstGeom>
+          <a:noFill/>
+          <a:ln w="10160">
+            <a:solidFill>
+              <a:srgbClr val="FF0000"/>
+            </a:solidFill>
+          </a:ln>
+        </p:spPr>
+        <p:style>
+          <a:lnRef idx="2">
+            <a:schemeClr val="accent1">
+              <a:shade val="50000"/>
+            </a:schemeClr>
+          </a:lnRef>
+          <a:fillRef idx="1">
+            <a:schemeClr val="accent1"/>
+          </a:fillRef>
+          <a:effectRef idx="0">
+            <a:schemeClr val="accent1"/>
+          </a:effectRef>
+          <a:fontRef idx="minor">
+            <a:schemeClr val="lt1"/>
+          </a:fontRef>
+        </p:style>
+        <p:txBody>
+          <a:bodyPr rtlCol="0" anchor="ctr"/>
+          <a:lstStyle/>
+          <a:p>
+            <a:pPr algn="ctr"/>
+            <a:endParaRPr kumimoji="1" lang="zh-CN" altLang="en-US" dirty="0"/>
+          </a:p>
+        </p:txBody>
+      </p:sp>
+      <p:sp>
+        <p:nvSpPr>
+          <p:cNvPr id="17" name="矩形 16">
+            <a:extLst>
+              <a:ext uri="{FF2B5EF4-FFF2-40B4-BE49-F238E27FC236}">
+                <a16:creationId xmlns:a16="http://schemas.microsoft.com/office/drawing/2014/main" id="{6E82C6AF-909C-0743-B8F5-56FA655985BB}"/>
+              </a:ext>
+            </a:extLst>
+          </p:cNvPr>
+          <p:cNvSpPr/>
+          <p:nvPr/>
+        </p:nvSpPr>
+        <p:spPr>
+          <a:xfrm>
+            <a:off x="2114736" y="3647466"/>
+            <a:ext cx="177800" cy="158750"/>
+          </a:xfrm>
+          <a:prstGeom prst="rect">
+            <a:avLst/>
+          </a:prstGeom>
+          <a:noFill/>
+          <a:ln w="10160">
+            <a:solidFill>
+              <a:srgbClr val="FF0000"/>
+            </a:solidFill>
+          </a:ln>
+        </p:spPr>
+        <p:style>
+          <a:lnRef idx="2">
+            <a:schemeClr val="accent1">
+              <a:shade val="50000"/>
+            </a:schemeClr>
+          </a:lnRef>
+          <a:fillRef idx="1">
+            <a:schemeClr val="accent1"/>
+          </a:fillRef>
+          <a:effectRef idx="0">
+            <a:schemeClr val="accent1"/>
+          </a:effectRef>
+          <a:fontRef idx="minor">
+            <a:schemeClr val="lt1"/>
+          </a:fontRef>
+        </p:style>
+        <p:txBody>
+          <a:bodyPr rtlCol="0" anchor="ctr"/>
+          <a:lstStyle/>
+          <a:p>
+            <a:pPr algn="ctr"/>
+            <a:endParaRPr kumimoji="1" lang="zh-CN" altLang="en-US" dirty="0"/>
+          </a:p>
+        </p:txBody>
+      </p:sp>
+      <p:sp>
+        <p:nvSpPr>
+          <p:cNvPr id="18" name="矩形 17">
+            <a:extLst>
+              <a:ext uri="{FF2B5EF4-FFF2-40B4-BE49-F238E27FC236}">
+                <a16:creationId xmlns:a16="http://schemas.microsoft.com/office/drawing/2014/main" id="{82B8F425-DF1C-8D45-A7BC-AAD5895A9D79}"/>
+              </a:ext>
+            </a:extLst>
+          </p:cNvPr>
+          <p:cNvSpPr/>
+          <p:nvPr/>
+        </p:nvSpPr>
+        <p:spPr>
+          <a:xfrm>
+            <a:off x="2921141" y="3011424"/>
+            <a:ext cx="247363" cy="308877"/>
+          </a:xfrm>
+          <a:prstGeom prst="rect">
+            <a:avLst/>
+          </a:prstGeom>
+          <a:noFill/>
+          <a:ln w="10160">
+            <a:solidFill>
+              <a:srgbClr val="FF0000"/>
+            </a:solidFill>
+          </a:ln>
+        </p:spPr>
+        <p:style>
+          <a:lnRef idx="2">
+            <a:schemeClr val="accent1">
+              <a:shade val="50000"/>
+            </a:schemeClr>
+          </a:lnRef>
+          <a:fillRef idx="1">
+            <a:schemeClr val="accent1"/>
+          </a:fillRef>
+          <a:effectRef idx="0">
+            <a:schemeClr val="accent1"/>
+          </a:effectRef>
+          <a:fontRef idx="minor">
+            <a:schemeClr val="lt1"/>
+          </a:fontRef>
+        </p:style>
+        <p:txBody>
+          <a:bodyPr rtlCol="0" anchor="ctr"/>
+          <a:lstStyle/>
+          <a:p>
+            <a:pPr algn="ctr"/>
+            <a:endParaRPr kumimoji="1" lang="zh-CN" altLang="en-US" dirty="0"/>
+          </a:p>
+        </p:txBody>
+      </p:sp>
+      <p:sp>
+        <p:nvSpPr>
+          <p:cNvPr id="19" name="矩形 18">
+            <a:extLst>
+              <a:ext uri="{FF2B5EF4-FFF2-40B4-BE49-F238E27FC236}">
+                <a16:creationId xmlns:a16="http://schemas.microsoft.com/office/drawing/2014/main" id="{841C39A8-7751-DA45-98BE-A00EC74FB7A9}"/>
+              </a:ext>
+            </a:extLst>
+          </p:cNvPr>
+          <p:cNvSpPr/>
+          <p:nvPr/>
+        </p:nvSpPr>
+        <p:spPr>
+          <a:xfrm>
+            <a:off x="2414590" y="3104009"/>
+            <a:ext cx="315163" cy="308877"/>
+          </a:xfrm>
+          <a:prstGeom prst="rect">
+            <a:avLst/>
+          </a:prstGeom>
+          <a:noFill/>
+          <a:ln w="10160">
+            <a:solidFill>
+              <a:srgbClr val="FF0000"/>
+            </a:solidFill>
+          </a:ln>
+        </p:spPr>
+        <p:style>
+          <a:lnRef idx="2">
+            <a:schemeClr val="accent1">
+              <a:shade val="50000"/>
+            </a:schemeClr>
+          </a:lnRef>
+          <a:fillRef idx="1">
+            <a:schemeClr val="accent1"/>
+          </a:fillRef>
+          <a:effectRef idx="0">
+            <a:schemeClr val="accent1"/>
+          </a:effectRef>
+          <a:fontRef idx="minor">
+            <a:schemeClr val="lt1"/>
+          </a:fontRef>
+        </p:style>
+        <p:txBody>
+          <a:bodyPr rtlCol="0" anchor="ctr"/>
+          <a:lstStyle/>
+          <a:p>
+            <a:pPr algn="ctr"/>
+            <a:endParaRPr kumimoji="1" lang="zh-CN" altLang="en-US" dirty="0"/>
+          </a:p>
+        </p:txBody>
+      </p:sp>
+      <p:sp>
+        <p:nvSpPr>
+          <p:cNvPr id="20" name="矩形 19">
+            <a:extLst>
+              <a:ext uri="{FF2B5EF4-FFF2-40B4-BE49-F238E27FC236}">
+                <a16:creationId xmlns:a16="http://schemas.microsoft.com/office/drawing/2014/main" id="{8F30D648-182E-EF4E-8EF7-31441C702522}"/>
+              </a:ext>
+            </a:extLst>
+          </p:cNvPr>
+          <p:cNvSpPr/>
+          <p:nvPr/>
+        </p:nvSpPr>
+        <p:spPr>
+          <a:xfrm>
+            <a:off x="1639794" y="2269937"/>
+            <a:ext cx="177800" cy="158750"/>
+          </a:xfrm>
+          <a:prstGeom prst="rect">
+            <a:avLst/>
+          </a:prstGeom>
+          <a:noFill/>
+          <a:ln w="10160">
+            <a:solidFill>
+              <a:srgbClr val="FF0000"/>
+            </a:solidFill>
+          </a:ln>
+        </p:spPr>
+        <p:style>
+          <a:lnRef idx="2">
+            <a:schemeClr val="accent1">
+              <a:shade val="50000"/>
+            </a:schemeClr>
+          </a:lnRef>
+          <a:fillRef idx="1">
+            <a:schemeClr val="accent1"/>
+          </a:fillRef>
+          <a:effectRef idx="0">
+            <a:schemeClr val="accent1"/>
+          </a:effectRef>
+          <a:fontRef idx="minor">
+            <a:schemeClr val="lt1"/>
+          </a:fontRef>
+        </p:style>
+        <p:txBody>
+          <a:bodyPr rtlCol="0" anchor="ctr"/>
+          <a:lstStyle/>
+          <a:p>
+            <a:pPr algn="ctr"/>
+            <a:endParaRPr kumimoji="1" lang="zh-CN" altLang="en-US" dirty="0"/>
+          </a:p>
+        </p:txBody>
+      </p:sp>
+      <p:sp>
+        <p:nvSpPr>
+          <p:cNvPr id="22" name="矩形 21">
+            <a:extLst>
+              <a:ext uri="{FF2B5EF4-FFF2-40B4-BE49-F238E27FC236}">
+                <a16:creationId xmlns:a16="http://schemas.microsoft.com/office/drawing/2014/main" id="{ADBA6EB1-F408-2142-A816-59B76D61F383}"/>
+              </a:ext>
+            </a:extLst>
+          </p:cNvPr>
+          <p:cNvSpPr/>
+          <p:nvPr/>
+        </p:nvSpPr>
+        <p:spPr>
+          <a:xfrm>
+            <a:off x="1626346" y="2666252"/>
+            <a:ext cx="177800" cy="245367"/>
+          </a:xfrm>
+          <a:prstGeom prst="rect">
+            <a:avLst/>
+          </a:prstGeom>
+          <a:noFill/>
+          <a:ln w="10160">
+            <a:solidFill>
+              <a:srgbClr val="FF0000"/>
+            </a:solidFill>
+          </a:ln>
+        </p:spPr>
+        <p:style>
+          <a:lnRef idx="2">
+            <a:schemeClr val="accent1">
+              <a:shade val="50000"/>
+            </a:schemeClr>
+          </a:lnRef>
+          <a:fillRef idx="1">
+            <a:schemeClr val="accent1"/>
+          </a:fillRef>
+          <a:effectRef idx="0">
+            <a:schemeClr val="accent1"/>
+          </a:effectRef>
+          <a:fontRef idx="minor">
+            <a:schemeClr val="lt1"/>
+          </a:fontRef>
+        </p:style>
+        <p:txBody>
+          <a:bodyPr rtlCol="0" anchor="ctr"/>
+          <a:lstStyle/>
+          <a:p>
+            <a:pPr algn="ctr"/>
+            <a:endParaRPr kumimoji="1" lang="zh-CN" altLang="en-US" dirty="0"/>
+          </a:p>
+        </p:txBody>
+      </p:sp>
+      <p:sp>
+        <p:nvSpPr>
+          <p:cNvPr id="24" name="矩形 23">
+            <a:extLst>
+              <a:ext uri="{FF2B5EF4-FFF2-40B4-BE49-F238E27FC236}">
+                <a16:creationId xmlns:a16="http://schemas.microsoft.com/office/drawing/2014/main" id="{41EC175D-324F-2644-8713-BF2DB3553920}"/>
+              </a:ext>
+            </a:extLst>
+          </p:cNvPr>
+          <p:cNvSpPr/>
+          <p:nvPr/>
+        </p:nvSpPr>
+        <p:spPr>
+          <a:xfrm>
+            <a:off x="1537446" y="1320030"/>
+            <a:ext cx="177800" cy="118805"/>
+          </a:xfrm>
+          <a:prstGeom prst="rect">
+            <a:avLst/>
+          </a:prstGeom>
+          <a:noFill/>
+          <a:ln w="10160">
+            <a:solidFill>
+              <a:srgbClr val="FF0000"/>
+            </a:solidFill>
+          </a:ln>
+        </p:spPr>
+        <p:style>
+          <a:lnRef idx="2">
+            <a:schemeClr val="accent1">
+              <a:shade val="50000"/>
+            </a:schemeClr>
+          </a:lnRef>
+          <a:fillRef idx="1">
+            <a:schemeClr val="accent1"/>
+          </a:fillRef>
+          <a:effectRef idx="0">
+            <a:schemeClr val="accent1"/>
+          </a:effectRef>
+          <a:fontRef idx="minor">
+            <a:schemeClr val="lt1"/>
+          </a:fontRef>
+        </p:style>
+        <p:txBody>
+          <a:bodyPr rtlCol="0" anchor="ctr"/>
+          <a:lstStyle/>
+          <a:p>
+            <a:pPr algn="ctr"/>
+            <a:endParaRPr kumimoji="1" lang="zh-CN" altLang="en-US" dirty="0"/>
+          </a:p>
+        </p:txBody>
+      </p:sp>
+      <p:sp>
+        <p:nvSpPr>
+          <p:cNvPr id="26" name="矩形 25">
+            <a:extLst>
+              <a:ext uri="{FF2B5EF4-FFF2-40B4-BE49-F238E27FC236}">
+                <a16:creationId xmlns:a16="http://schemas.microsoft.com/office/drawing/2014/main" id="{30FBD3D5-318D-6242-9C1E-B8588703F71E}"/>
+              </a:ext>
+            </a:extLst>
+          </p:cNvPr>
+          <p:cNvSpPr/>
+          <p:nvPr/>
+        </p:nvSpPr>
+        <p:spPr>
+          <a:xfrm>
+            <a:off x="2928469" y="1401843"/>
+            <a:ext cx="246759" cy="258133"/>
+          </a:xfrm>
+          <a:prstGeom prst="rect">
+            <a:avLst/>
+          </a:prstGeom>
+          <a:noFill/>
+          <a:ln w="10160">
+            <a:solidFill>
+              <a:srgbClr val="FF0000"/>
+            </a:solidFill>
+          </a:ln>
+        </p:spPr>
+        <p:style>
+          <a:lnRef idx="2">
+            <a:schemeClr val="accent1">
+              <a:shade val="50000"/>
+            </a:schemeClr>
+          </a:lnRef>
+          <a:fillRef idx="1">
+            <a:schemeClr val="accent1"/>
+          </a:fillRef>
+          <a:effectRef idx="0">
+            <a:schemeClr val="accent1"/>
+          </a:effectRef>
+          <a:fontRef idx="minor">
+            <a:schemeClr val="lt1"/>
+          </a:fontRef>
+        </p:style>
+        <p:txBody>
+          <a:bodyPr rtlCol="0" anchor="ctr"/>
+          <a:lstStyle/>
+          <a:p>
+            <a:pPr algn="ctr"/>
+            <a:endParaRPr kumimoji="1" lang="zh-CN" altLang="en-US" dirty="0"/>
+          </a:p>
+        </p:txBody>
+      </p:sp>
+      <p:sp>
+        <p:nvSpPr>
+          <p:cNvPr id="28" name="矩形 27">
+            <a:extLst>
+              <a:ext uri="{FF2B5EF4-FFF2-40B4-BE49-F238E27FC236}">
+                <a16:creationId xmlns:a16="http://schemas.microsoft.com/office/drawing/2014/main" id="{05799EF5-4D52-F34F-BD57-07F49ED4EFBB}"/>
+              </a:ext>
+            </a:extLst>
+          </p:cNvPr>
+          <p:cNvSpPr/>
+          <p:nvPr/>
+        </p:nvSpPr>
+        <p:spPr>
+          <a:xfrm>
+            <a:off x="2369801" y="1852633"/>
+            <a:ext cx="299441" cy="258133"/>
+          </a:xfrm>
+          <a:prstGeom prst="rect">
+            <a:avLst/>
+          </a:prstGeom>
+          <a:noFill/>
+          <a:ln w="10160">
+            <a:solidFill>
+              <a:srgbClr val="FF0000"/>
+            </a:solidFill>
+          </a:ln>
+        </p:spPr>
+        <p:style>
+          <a:lnRef idx="2">
+            <a:schemeClr val="accent1">
+              <a:shade val="50000"/>
+            </a:schemeClr>
+          </a:lnRef>
+          <a:fillRef idx="1">
+            <a:schemeClr val="accent1"/>
+          </a:fillRef>
+          <a:effectRef idx="0">
+            <a:schemeClr val="accent1"/>
+          </a:effectRef>
+          <a:fontRef idx="minor">
+            <a:schemeClr val="lt1"/>
+          </a:fontRef>
+        </p:style>
+        <p:txBody>
+          <a:bodyPr rtlCol="0" anchor="ctr"/>
+          <a:lstStyle/>
+          <a:p>
+            <a:pPr algn="ctr"/>
+            <a:endParaRPr kumimoji="1" lang="zh-CN" altLang="en-US" dirty="0"/>
+          </a:p>
+        </p:txBody>
+      </p:sp>
+      <p:sp>
+        <p:nvSpPr>
+          <p:cNvPr id="30" name="矩形 29">
+            <a:extLst>
+              <a:ext uri="{FF2B5EF4-FFF2-40B4-BE49-F238E27FC236}">
+                <a16:creationId xmlns:a16="http://schemas.microsoft.com/office/drawing/2014/main" id="{05763B45-8F7D-AB4C-8F8E-1428F8D95DBD}"/>
+              </a:ext>
+            </a:extLst>
+          </p:cNvPr>
+          <p:cNvSpPr/>
+          <p:nvPr/>
+        </p:nvSpPr>
+        <p:spPr>
+          <a:xfrm>
+            <a:off x="2776822" y="1790742"/>
+            <a:ext cx="164491" cy="212871"/>
+          </a:xfrm>
+          <a:prstGeom prst="rect">
+            <a:avLst/>
+          </a:prstGeom>
+          <a:noFill/>
+          <a:ln w="10160">
+            <a:solidFill>
+              <a:srgbClr val="FF0000"/>
+            </a:solidFill>
+          </a:ln>
+        </p:spPr>
+        <p:style>
+          <a:lnRef idx="2">
+            <a:schemeClr val="accent1">
+              <a:shade val="50000"/>
+            </a:schemeClr>
+          </a:lnRef>
+          <a:fillRef idx="1">
+            <a:schemeClr val="accent1"/>
+          </a:fillRef>
+          <a:effectRef idx="0">
+            <a:schemeClr val="accent1"/>
+          </a:effectRef>
+          <a:fontRef idx="minor">
+            <a:schemeClr val="lt1"/>
+          </a:fontRef>
+        </p:style>
+        <p:txBody>
+          <a:bodyPr rtlCol="0" anchor="ctr"/>
+          <a:lstStyle/>
+          <a:p>
+            <a:pPr algn="ctr"/>
+            <a:endParaRPr kumimoji="1" lang="zh-CN" altLang="en-US" dirty="0"/>
+          </a:p>
+        </p:txBody>
+      </p:sp>
+    </p:spTree>
+    <p:extLst>
+      <p:ext uri="{BB962C8B-B14F-4D97-AF65-F5344CB8AC3E}">
+        <p14:creationId xmlns:p14="http://schemas.microsoft.com/office/powerpoint/2010/main" val="250498534"/>
+      </p:ext>
+    </p:extLst>
+  </p:cSld>
+  <p:clrMapOvr>
+    <a:masterClrMapping/>
+  </p:clrMapOvr>
+</p:sld>
+</file>
+
+<file path=ppt/slides/slide12.xml><?xml version="1.0" encoding="utf-8"?>
+<p:sld xmlns:a="http://schemas.openxmlformats.org/drawingml/2006/main" xmlns:r="http://schemas.openxmlformats.org/officeDocument/2006/relationships" xmlns:p="http://schemas.openxmlformats.org/presentationml/2006/main">
+  <p:cSld>
+    <p:spTree>
+      <p:nvGrpSpPr>
+        <p:cNvPr id="1" name=""/>
+        <p:cNvGrpSpPr/>
+        <p:nvPr/>
+      </p:nvGrpSpPr>
+      <p:grpSpPr>
+        <a:xfrm>
+          <a:off x="0" y="0"/>
+          <a:ext cx="0" cy="0"/>
+          <a:chOff x="0" y="0"/>
+          <a:chExt cx="0" cy="0"/>
+        </a:xfrm>
+      </p:grpSpPr>
+      <p:pic>
+        <p:nvPicPr>
+          <p:cNvPr id="14" name="图片 13">
+            <a:extLst>
+              <a:ext uri="{FF2B5EF4-FFF2-40B4-BE49-F238E27FC236}">
+                <a16:creationId xmlns:a16="http://schemas.microsoft.com/office/drawing/2014/main" id="{EDBA625D-55BA-8947-956D-0E69859560DE}"/>
+              </a:ext>
+            </a:extLst>
+          </p:cNvPr>
+          <p:cNvPicPr>
+            <a:picLocks noChangeAspect="1"/>
+          </p:cNvPicPr>
+          <p:nvPr/>
+        </p:nvPicPr>
+        <p:blipFill>
+          <a:blip r:embed="rId2"/>
+          <a:stretch>
+            <a:fillRect/>
+          </a:stretch>
+        </p:blipFill>
+        <p:spPr>
+          <a:xfrm>
+            <a:off x="2365170" y="4866680"/>
+            <a:ext cx="812800" cy="812800"/>
+          </a:xfrm>
+          <a:prstGeom prst="rect">
+            <a:avLst/>
+          </a:prstGeom>
+        </p:spPr>
+      </p:pic>
+      <p:pic>
+        <p:nvPicPr>
+          <p:cNvPr id="16" name="图片 15">
+            <a:extLst>
+              <a:ext uri="{FF2B5EF4-FFF2-40B4-BE49-F238E27FC236}">
+                <a16:creationId xmlns:a16="http://schemas.microsoft.com/office/drawing/2014/main" id="{E18A909A-37B8-8846-88AF-AE911C29138B}"/>
+              </a:ext>
+            </a:extLst>
+          </p:cNvPr>
+          <p:cNvPicPr>
+            <a:picLocks noChangeAspect="1"/>
+          </p:cNvPicPr>
+          <p:nvPr/>
+        </p:nvPicPr>
+        <p:blipFill>
+          <a:blip r:embed="rId3"/>
+          <a:stretch>
+            <a:fillRect/>
+          </a:stretch>
+        </p:blipFill>
+        <p:spPr>
+          <a:xfrm>
+            <a:off x="2365170" y="5714205"/>
+            <a:ext cx="812800" cy="812800"/>
+          </a:xfrm>
+          <a:prstGeom prst="rect">
+            <a:avLst/>
+          </a:prstGeom>
+        </p:spPr>
+      </p:pic>
+      <p:pic>
+        <p:nvPicPr>
+          <p:cNvPr id="17" name="图片 16">
+            <a:extLst>
+              <a:ext uri="{FF2B5EF4-FFF2-40B4-BE49-F238E27FC236}">
+                <a16:creationId xmlns:a16="http://schemas.microsoft.com/office/drawing/2014/main" id="{D6E68030-9860-2046-98C2-21D828ADBCD5}"/>
+              </a:ext>
+            </a:extLst>
+          </p:cNvPr>
+          <p:cNvPicPr>
+            <a:picLocks noChangeAspect="1"/>
+          </p:cNvPicPr>
+          <p:nvPr/>
+        </p:nvPicPr>
+        <p:blipFill>
+          <a:blip r:embed="rId4"/>
+          <a:stretch>
+            <a:fillRect/>
+          </a:stretch>
+        </p:blipFill>
+        <p:spPr>
+          <a:xfrm>
+            <a:off x="1497070" y="5720618"/>
+            <a:ext cx="812800" cy="812800"/>
+          </a:xfrm>
+          <a:prstGeom prst="rect">
+            <a:avLst/>
+          </a:prstGeom>
+        </p:spPr>
+      </p:pic>
+      <p:pic>
+        <p:nvPicPr>
+          <p:cNvPr id="18" name="图片 17">
+            <a:extLst>
+              <a:ext uri="{FF2B5EF4-FFF2-40B4-BE49-F238E27FC236}">
+                <a16:creationId xmlns:a16="http://schemas.microsoft.com/office/drawing/2014/main" id="{8D0558C9-7D02-494C-AB77-D66DAFBBAE77}"/>
+              </a:ext>
+            </a:extLst>
+          </p:cNvPr>
+          <p:cNvPicPr>
+            <a:picLocks noChangeAspect="1"/>
+          </p:cNvPicPr>
+          <p:nvPr/>
+        </p:nvPicPr>
+        <p:blipFill>
+          <a:blip r:embed="rId5"/>
+          <a:stretch>
+            <a:fillRect/>
+          </a:stretch>
+        </p:blipFill>
+        <p:spPr>
+          <a:xfrm>
+            <a:off x="1497070" y="4866680"/>
+            <a:ext cx="812800" cy="812800"/>
+          </a:xfrm>
+          <a:prstGeom prst="rect">
+            <a:avLst/>
+          </a:prstGeom>
+        </p:spPr>
+      </p:pic>
+      <p:pic>
+        <p:nvPicPr>
+          <p:cNvPr id="19" name="图片 18">
+            <a:extLst>
+              <a:ext uri="{FF2B5EF4-FFF2-40B4-BE49-F238E27FC236}">
+                <a16:creationId xmlns:a16="http://schemas.microsoft.com/office/drawing/2014/main" id="{1C5C3CE3-4CB9-7E4B-A724-98728027D854}"/>
+              </a:ext>
+            </a:extLst>
+          </p:cNvPr>
+          <p:cNvPicPr>
+            <a:picLocks noChangeAspect="1"/>
+          </p:cNvPicPr>
+          <p:nvPr/>
+        </p:nvPicPr>
+        <p:blipFill>
+          <a:blip r:embed="rId6"/>
+          <a:stretch>
+            <a:fillRect/>
+          </a:stretch>
+        </p:blipFill>
+        <p:spPr>
+          <a:xfrm>
+            <a:off x="2365170" y="4012742"/>
+            <a:ext cx="812800" cy="812800"/>
+          </a:xfrm>
+          <a:prstGeom prst="rect">
+            <a:avLst/>
+          </a:prstGeom>
+        </p:spPr>
+      </p:pic>
+      <p:pic>
+        <p:nvPicPr>
+          <p:cNvPr id="20" name="图片 19">
+            <a:extLst>
+              <a:ext uri="{FF2B5EF4-FFF2-40B4-BE49-F238E27FC236}">
+                <a16:creationId xmlns:a16="http://schemas.microsoft.com/office/drawing/2014/main" id="{1D9E6ADE-D040-F945-A154-8212C3792C36}"/>
+              </a:ext>
+            </a:extLst>
+          </p:cNvPr>
+          <p:cNvPicPr>
+            <a:picLocks noChangeAspect="1"/>
+          </p:cNvPicPr>
+          <p:nvPr/>
+        </p:nvPicPr>
+        <p:blipFill>
+          <a:blip r:embed="rId7"/>
+          <a:stretch>
+            <a:fillRect/>
+          </a:stretch>
+        </p:blipFill>
+        <p:spPr>
+          <a:xfrm>
+            <a:off x="1497070" y="4012742"/>
+            <a:ext cx="812800" cy="812800"/>
+          </a:xfrm>
+          <a:prstGeom prst="rect">
+            <a:avLst/>
+          </a:prstGeom>
+        </p:spPr>
+      </p:pic>
+      <p:pic>
+        <p:nvPicPr>
+          <p:cNvPr id="22" name="图片 21">
+            <a:extLst>
+              <a:ext uri="{FF2B5EF4-FFF2-40B4-BE49-F238E27FC236}">
+                <a16:creationId xmlns:a16="http://schemas.microsoft.com/office/drawing/2014/main" id="{0D33EEC2-1C40-F04B-9F95-0FF7CC322311}"/>
+              </a:ext>
+            </a:extLst>
+          </p:cNvPr>
+          <p:cNvPicPr>
+            <a:picLocks noChangeAspect="1"/>
+          </p:cNvPicPr>
+          <p:nvPr/>
+        </p:nvPicPr>
+        <p:blipFill>
+          <a:blip r:embed="rId8"/>
+          <a:stretch>
+            <a:fillRect/>
+          </a:stretch>
+        </p:blipFill>
+        <p:spPr>
+          <a:xfrm>
+            <a:off x="4163408" y="4012742"/>
+            <a:ext cx="812800" cy="812800"/>
+          </a:xfrm>
+          <a:prstGeom prst="rect">
+            <a:avLst/>
+          </a:prstGeom>
+        </p:spPr>
+      </p:pic>
+      <p:pic>
+        <p:nvPicPr>
+          <p:cNvPr id="24" name="图片 23">
+            <a:extLst>
+              <a:ext uri="{FF2B5EF4-FFF2-40B4-BE49-F238E27FC236}">
+                <a16:creationId xmlns:a16="http://schemas.microsoft.com/office/drawing/2014/main" id="{026839C0-E9C4-3148-A22C-E4C7499F2C0A}"/>
+              </a:ext>
+            </a:extLst>
+          </p:cNvPr>
+          <p:cNvPicPr>
+            <a:picLocks noChangeAspect="1"/>
+          </p:cNvPicPr>
+          <p:nvPr/>
+        </p:nvPicPr>
+        <p:blipFill>
+          <a:blip r:embed="rId9"/>
+          <a:stretch>
+            <a:fillRect/>
+          </a:stretch>
+        </p:blipFill>
+        <p:spPr>
+          <a:xfrm>
+            <a:off x="4163408" y="4853740"/>
+            <a:ext cx="812800" cy="812800"/>
+          </a:xfrm>
+          <a:prstGeom prst="rect">
+            <a:avLst/>
+          </a:prstGeom>
+        </p:spPr>
+      </p:pic>
+      <p:pic>
+        <p:nvPicPr>
+          <p:cNvPr id="26" name="图片 25">
+            <a:extLst>
+              <a:ext uri="{FF2B5EF4-FFF2-40B4-BE49-F238E27FC236}">
+                <a16:creationId xmlns:a16="http://schemas.microsoft.com/office/drawing/2014/main" id="{08048546-9B83-A244-88D2-A3C8F6BE9D23}"/>
+              </a:ext>
+            </a:extLst>
+          </p:cNvPr>
+          <p:cNvPicPr>
+            <a:picLocks noChangeAspect="1"/>
+          </p:cNvPicPr>
+          <p:nvPr/>
+        </p:nvPicPr>
+        <p:blipFill>
+          <a:blip r:embed="rId10"/>
+          <a:stretch>
+            <a:fillRect/>
+          </a:stretch>
+        </p:blipFill>
+        <p:spPr>
+          <a:xfrm>
+            <a:off x="4163408" y="5714205"/>
+            <a:ext cx="812800" cy="812800"/>
+          </a:xfrm>
+          <a:prstGeom prst="rect">
+            <a:avLst/>
+          </a:prstGeom>
+        </p:spPr>
+      </p:pic>
+      <p:pic>
+        <p:nvPicPr>
+          <p:cNvPr id="28" name="图片 27">
+            <a:extLst>
+              <a:ext uri="{FF2B5EF4-FFF2-40B4-BE49-F238E27FC236}">
+                <a16:creationId xmlns:a16="http://schemas.microsoft.com/office/drawing/2014/main" id="{8A854BB8-6FB7-BB47-A0BA-82ACFEC610EB}"/>
+              </a:ext>
+            </a:extLst>
+          </p:cNvPr>
+          <p:cNvPicPr>
+            <a:picLocks noChangeAspect="1"/>
+          </p:cNvPicPr>
+          <p:nvPr/>
+        </p:nvPicPr>
+        <p:blipFill>
+          <a:blip r:embed="rId11"/>
+          <a:stretch>
+            <a:fillRect/>
+          </a:stretch>
+        </p:blipFill>
+        <p:spPr>
+          <a:xfrm>
+            <a:off x="3305673" y="5714205"/>
+            <a:ext cx="812800" cy="812800"/>
+          </a:xfrm>
+          <a:prstGeom prst="rect">
+            <a:avLst/>
+          </a:prstGeom>
+        </p:spPr>
+      </p:pic>
+      <p:pic>
+        <p:nvPicPr>
+          <p:cNvPr id="30" name="图片 29">
+            <a:extLst>
+              <a:ext uri="{FF2B5EF4-FFF2-40B4-BE49-F238E27FC236}">
+                <a16:creationId xmlns:a16="http://schemas.microsoft.com/office/drawing/2014/main" id="{A9F9D9B2-A086-674C-AA98-9A4B600DB816}"/>
+              </a:ext>
+            </a:extLst>
+          </p:cNvPr>
+          <p:cNvPicPr>
+            <a:picLocks noChangeAspect="1"/>
+          </p:cNvPicPr>
+          <p:nvPr/>
+        </p:nvPicPr>
+        <p:blipFill>
+          <a:blip r:embed="rId12"/>
+          <a:stretch>
+            <a:fillRect/>
+          </a:stretch>
+        </p:blipFill>
+        <p:spPr>
+          <a:xfrm>
+            <a:off x="3305673" y="4866680"/>
+            <a:ext cx="812800" cy="812800"/>
+          </a:xfrm>
+          <a:prstGeom prst="rect">
+            <a:avLst/>
+          </a:prstGeom>
+        </p:spPr>
+      </p:pic>
+      <p:pic>
+        <p:nvPicPr>
+          <p:cNvPr id="32" name="图片 31">
+            <a:extLst>
+              <a:ext uri="{FF2B5EF4-FFF2-40B4-BE49-F238E27FC236}">
+                <a16:creationId xmlns:a16="http://schemas.microsoft.com/office/drawing/2014/main" id="{1E66D254-7DA8-C64D-9997-B1908982ABEC}"/>
+              </a:ext>
+            </a:extLst>
+          </p:cNvPr>
+          <p:cNvPicPr>
+            <a:picLocks noChangeAspect="1"/>
+          </p:cNvPicPr>
+          <p:nvPr/>
+        </p:nvPicPr>
+        <p:blipFill>
+          <a:blip r:embed="rId13"/>
+          <a:stretch>
+            <a:fillRect/>
+          </a:stretch>
+        </p:blipFill>
+        <p:spPr>
+          <a:xfrm>
+            <a:off x="3305673" y="4019155"/>
+            <a:ext cx="812800" cy="812800"/>
+          </a:xfrm>
+          <a:prstGeom prst="rect">
+            <a:avLst/>
+          </a:prstGeom>
+        </p:spPr>
+      </p:pic>
+      <p:sp>
+        <p:nvSpPr>
+          <p:cNvPr id="15" name="矩形 14">
+            <a:extLst>
+              <a:ext uri="{FF2B5EF4-FFF2-40B4-BE49-F238E27FC236}">
+                <a16:creationId xmlns:a16="http://schemas.microsoft.com/office/drawing/2014/main" id="{5BE6DEE9-3380-E146-B7B0-DB47827A865D}"/>
+              </a:ext>
+            </a:extLst>
+          </p:cNvPr>
+          <p:cNvSpPr/>
+          <p:nvPr/>
+        </p:nvSpPr>
+        <p:spPr>
+          <a:xfrm>
+            <a:off x="1808402" y="6033095"/>
+            <a:ext cx="315163" cy="308877"/>
+          </a:xfrm>
+          <a:prstGeom prst="rect">
+            <a:avLst/>
+          </a:prstGeom>
+          <a:noFill/>
+          <a:ln w="10160">
+            <a:solidFill>
+              <a:srgbClr val="FF0000"/>
+            </a:solidFill>
+          </a:ln>
+        </p:spPr>
+        <p:style>
+          <a:lnRef idx="2">
+            <a:schemeClr val="accent1">
+              <a:shade val="50000"/>
+            </a:schemeClr>
+          </a:lnRef>
+          <a:fillRef idx="1">
+            <a:schemeClr val="accent1"/>
+          </a:fillRef>
+          <a:effectRef idx="0">
+            <a:schemeClr val="accent1"/>
+          </a:effectRef>
+          <a:fontRef idx="minor">
+            <a:schemeClr val="lt1"/>
+          </a:fontRef>
+        </p:style>
+        <p:txBody>
+          <a:bodyPr rtlCol="0" anchor="ctr"/>
+          <a:lstStyle/>
+          <a:p>
+            <a:pPr algn="ctr"/>
+            <a:endParaRPr kumimoji="1" lang="zh-CN" altLang="en-US" dirty="0"/>
+          </a:p>
+        </p:txBody>
+      </p:sp>
+      <p:sp>
+        <p:nvSpPr>
+          <p:cNvPr id="21" name="矩形 20">
+            <a:extLst>
+              <a:ext uri="{FF2B5EF4-FFF2-40B4-BE49-F238E27FC236}">
+                <a16:creationId xmlns:a16="http://schemas.microsoft.com/office/drawing/2014/main" id="{C7F9C012-EEB8-BB4D-9CD4-7AEBE50C0624}"/>
+              </a:ext>
+            </a:extLst>
+          </p:cNvPr>
+          <p:cNvSpPr/>
+          <p:nvPr/>
+        </p:nvSpPr>
+        <p:spPr>
+          <a:xfrm>
+            <a:off x="2030503" y="5237629"/>
+            <a:ext cx="239023" cy="211153"/>
+          </a:xfrm>
+          <a:prstGeom prst="rect">
+            <a:avLst/>
+          </a:prstGeom>
+          <a:noFill/>
+          <a:ln w="10160">
+            <a:solidFill>
+              <a:srgbClr val="FF0000"/>
+            </a:solidFill>
+          </a:ln>
+        </p:spPr>
+        <p:style>
+          <a:lnRef idx="2">
+            <a:schemeClr val="accent1">
+              <a:shade val="50000"/>
+            </a:schemeClr>
+          </a:lnRef>
+          <a:fillRef idx="1">
+            <a:schemeClr val="accent1"/>
+          </a:fillRef>
+          <a:effectRef idx="0">
+            <a:schemeClr val="accent1"/>
+          </a:effectRef>
+          <a:fontRef idx="minor">
+            <a:schemeClr val="lt1"/>
+          </a:fontRef>
+        </p:style>
+        <p:txBody>
+          <a:bodyPr rtlCol="0" anchor="ctr"/>
+          <a:lstStyle/>
+          <a:p>
+            <a:pPr algn="ctr"/>
+            <a:endParaRPr kumimoji="1" lang="zh-CN" altLang="en-US" dirty="0"/>
+          </a:p>
+        </p:txBody>
+      </p:sp>
+      <p:sp>
+        <p:nvSpPr>
+          <p:cNvPr id="23" name="矩形 22">
+            <a:extLst>
+              <a:ext uri="{FF2B5EF4-FFF2-40B4-BE49-F238E27FC236}">
+                <a16:creationId xmlns:a16="http://schemas.microsoft.com/office/drawing/2014/main" id="{6C8FF78E-C9CF-D84D-A264-7A94D05DBF65}"/>
+              </a:ext>
+            </a:extLst>
+          </p:cNvPr>
+          <p:cNvSpPr/>
+          <p:nvPr/>
+        </p:nvSpPr>
+        <p:spPr>
+          <a:xfrm>
+            <a:off x="1788230" y="5257798"/>
+            <a:ext cx="183561" cy="157363"/>
+          </a:xfrm>
+          <a:prstGeom prst="rect">
+            <a:avLst/>
+          </a:prstGeom>
+          <a:noFill/>
+          <a:ln w="10160">
+            <a:solidFill>
+              <a:srgbClr val="FF0000"/>
+            </a:solidFill>
+          </a:ln>
+        </p:spPr>
+        <p:style>
+          <a:lnRef idx="2">
+            <a:schemeClr val="accent1">
+              <a:shade val="50000"/>
+            </a:schemeClr>
+          </a:lnRef>
+          <a:fillRef idx="1">
+            <a:schemeClr val="accent1"/>
+          </a:fillRef>
+          <a:effectRef idx="0">
+            <a:schemeClr val="accent1"/>
+          </a:effectRef>
+          <a:fontRef idx="minor">
+            <a:schemeClr val="lt1"/>
+          </a:fontRef>
+        </p:style>
+        <p:txBody>
+          <a:bodyPr rtlCol="0" anchor="ctr"/>
+          <a:lstStyle/>
+          <a:p>
+            <a:pPr algn="ctr"/>
+            <a:endParaRPr kumimoji="1" lang="zh-CN" altLang="en-US" dirty="0"/>
+          </a:p>
+        </p:txBody>
+      </p:sp>
+      <p:sp>
+        <p:nvSpPr>
+          <p:cNvPr id="25" name="矩形 24">
+            <a:extLst>
+              <a:ext uri="{FF2B5EF4-FFF2-40B4-BE49-F238E27FC236}">
+                <a16:creationId xmlns:a16="http://schemas.microsoft.com/office/drawing/2014/main" id="{2767B412-BB52-314B-9AD6-C584A584ACE5}"/>
+              </a:ext>
+            </a:extLst>
+          </p:cNvPr>
+          <p:cNvSpPr/>
+          <p:nvPr/>
+        </p:nvSpPr>
+        <p:spPr>
+          <a:xfrm>
+            <a:off x="2422613" y="4035322"/>
+            <a:ext cx="293692" cy="211153"/>
+          </a:xfrm>
+          <a:prstGeom prst="rect">
+            <a:avLst/>
+          </a:prstGeom>
+          <a:noFill/>
+          <a:ln w="10160">
+            <a:solidFill>
+              <a:srgbClr val="FF0000"/>
+            </a:solidFill>
+          </a:ln>
+        </p:spPr>
+        <p:style>
+          <a:lnRef idx="2">
+            <a:schemeClr val="accent1">
+              <a:shade val="50000"/>
+            </a:schemeClr>
+          </a:lnRef>
+          <a:fillRef idx="1">
+            <a:schemeClr val="accent1"/>
+          </a:fillRef>
+          <a:effectRef idx="0">
+            <a:schemeClr val="accent1"/>
+          </a:effectRef>
+          <a:fontRef idx="minor">
+            <a:schemeClr val="lt1"/>
+          </a:fontRef>
+        </p:style>
+        <p:txBody>
+          <a:bodyPr rtlCol="0" anchor="ctr"/>
+          <a:lstStyle/>
+          <a:p>
+            <a:pPr algn="ctr"/>
+            <a:endParaRPr kumimoji="1" lang="zh-CN" altLang="en-US" dirty="0"/>
+          </a:p>
+        </p:txBody>
+      </p:sp>
+      <p:sp>
+        <p:nvSpPr>
+          <p:cNvPr id="27" name="矩形 26">
+            <a:extLst>
+              <a:ext uri="{FF2B5EF4-FFF2-40B4-BE49-F238E27FC236}">
+                <a16:creationId xmlns:a16="http://schemas.microsoft.com/office/drawing/2014/main" id="{D354A19F-4270-5243-8C5A-450CB833226F}"/>
+              </a:ext>
+            </a:extLst>
+          </p:cNvPr>
+          <p:cNvSpPr/>
+          <p:nvPr/>
+        </p:nvSpPr>
+        <p:spPr>
+          <a:xfrm>
+            <a:off x="1933280" y="4347184"/>
+            <a:ext cx="183561" cy="157363"/>
+          </a:xfrm>
+          <a:prstGeom prst="rect">
+            <a:avLst/>
+          </a:prstGeom>
+          <a:noFill/>
+          <a:ln w="10160">
+            <a:solidFill>
+              <a:srgbClr val="FF0000"/>
+            </a:solidFill>
+          </a:ln>
+        </p:spPr>
+        <p:style>
+          <a:lnRef idx="2">
+            <a:schemeClr val="accent1">
+              <a:shade val="50000"/>
+            </a:schemeClr>
+          </a:lnRef>
+          <a:fillRef idx="1">
+            <a:schemeClr val="accent1"/>
+          </a:fillRef>
+          <a:effectRef idx="0">
+            <a:schemeClr val="accent1"/>
+          </a:effectRef>
+          <a:fontRef idx="minor">
+            <a:schemeClr val="lt1"/>
+          </a:fontRef>
+        </p:style>
+        <p:txBody>
+          <a:bodyPr rtlCol="0" anchor="ctr"/>
+          <a:lstStyle/>
+          <a:p>
+            <a:pPr algn="ctr"/>
+            <a:endParaRPr kumimoji="1" lang="zh-CN" altLang="en-US" dirty="0"/>
+          </a:p>
+        </p:txBody>
+      </p:sp>
+      <p:sp>
+        <p:nvSpPr>
+          <p:cNvPr id="29" name="矩形 28">
+            <a:extLst>
+              <a:ext uri="{FF2B5EF4-FFF2-40B4-BE49-F238E27FC236}">
+                <a16:creationId xmlns:a16="http://schemas.microsoft.com/office/drawing/2014/main" id="{20AD4649-B37F-A043-BE13-B5527040CAFC}"/>
+              </a:ext>
+            </a:extLst>
+          </p:cNvPr>
+          <p:cNvSpPr/>
+          <p:nvPr/>
+        </p:nvSpPr>
+        <p:spPr>
+          <a:xfrm>
+            <a:off x="2632721" y="4898984"/>
+            <a:ext cx="183561" cy="157363"/>
+          </a:xfrm>
+          <a:prstGeom prst="rect">
+            <a:avLst/>
+          </a:prstGeom>
+          <a:noFill/>
+          <a:ln w="10160">
+            <a:solidFill>
+              <a:srgbClr val="FF0000"/>
+            </a:solidFill>
+          </a:ln>
+        </p:spPr>
+        <p:style>
+          <a:lnRef idx="2">
+            <a:schemeClr val="accent1">
+              <a:shade val="50000"/>
+            </a:schemeClr>
+          </a:lnRef>
+          <a:fillRef idx="1">
+            <a:schemeClr val="accent1"/>
+          </a:fillRef>
+          <a:effectRef idx="0">
+            <a:schemeClr val="accent1"/>
+          </a:effectRef>
+          <a:fontRef idx="minor">
+            <a:schemeClr val="lt1"/>
+          </a:fontRef>
+        </p:style>
+        <p:txBody>
+          <a:bodyPr rtlCol="0" anchor="ctr"/>
+          <a:lstStyle/>
+          <a:p>
+            <a:pPr algn="ctr"/>
+            <a:endParaRPr kumimoji="1" lang="zh-CN" altLang="en-US" dirty="0"/>
+          </a:p>
+        </p:txBody>
+      </p:sp>
+      <p:sp>
+        <p:nvSpPr>
+          <p:cNvPr id="31" name="矩形 30">
+            <a:extLst>
+              <a:ext uri="{FF2B5EF4-FFF2-40B4-BE49-F238E27FC236}">
+                <a16:creationId xmlns:a16="http://schemas.microsoft.com/office/drawing/2014/main" id="{169DF69A-AE14-D748-8AA1-F2AAAF492B7E}"/>
+              </a:ext>
+            </a:extLst>
+          </p:cNvPr>
+          <p:cNvSpPr/>
+          <p:nvPr/>
+        </p:nvSpPr>
+        <p:spPr>
+          <a:xfrm>
+            <a:off x="2497850" y="5795599"/>
+            <a:ext cx="148319" cy="134556"/>
+          </a:xfrm>
+          <a:prstGeom prst="rect">
+            <a:avLst/>
+          </a:prstGeom>
+          <a:noFill/>
+          <a:ln w="10160">
+            <a:solidFill>
+              <a:srgbClr val="FF0000"/>
+            </a:solidFill>
+          </a:ln>
+        </p:spPr>
+        <p:style>
+          <a:lnRef idx="2">
+            <a:schemeClr val="accent1">
+              <a:shade val="50000"/>
+            </a:schemeClr>
+          </a:lnRef>
+          <a:fillRef idx="1">
+            <a:schemeClr val="accent1"/>
+          </a:fillRef>
+          <a:effectRef idx="0">
+            <a:schemeClr val="accent1"/>
+          </a:effectRef>
+          <a:fontRef idx="minor">
+            <a:schemeClr val="lt1"/>
+          </a:fontRef>
+        </p:style>
+        <p:txBody>
+          <a:bodyPr rtlCol="0" anchor="ctr"/>
+          <a:lstStyle/>
+          <a:p>
+            <a:pPr algn="ctr"/>
+            <a:endParaRPr kumimoji="1" lang="zh-CN" altLang="en-US" dirty="0"/>
+          </a:p>
+        </p:txBody>
+      </p:sp>
+      <p:sp>
+        <p:nvSpPr>
+          <p:cNvPr id="33" name="矩形 32">
+            <a:extLst>
+              <a:ext uri="{FF2B5EF4-FFF2-40B4-BE49-F238E27FC236}">
+                <a16:creationId xmlns:a16="http://schemas.microsoft.com/office/drawing/2014/main" id="{E44F4174-4CAB-1945-9995-CB2BC2E2F797}"/>
+              </a:ext>
+            </a:extLst>
+          </p:cNvPr>
+          <p:cNvSpPr/>
+          <p:nvPr/>
+        </p:nvSpPr>
+        <p:spPr>
+          <a:xfrm>
+            <a:off x="2690882" y="6335248"/>
+            <a:ext cx="148319" cy="134556"/>
+          </a:xfrm>
+          <a:prstGeom prst="rect">
+            <a:avLst/>
+          </a:prstGeom>
+          <a:noFill/>
+          <a:ln w="10160">
+            <a:solidFill>
+              <a:srgbClr val="FF0000"/>
+            </a:solidFill>
+          </a:ln>
+        </p:spPr>
+        <p:style>
+          <a:lnRef idx="2">
+            <a:schemeClr val="accent1">
+              <a:shade val="50000"/>
+            </a:schemeClr>
+          </a:lnRef>
+          <a:fillRef idx="1">
+            <a:schemeClr val="accent1"/>
+          </a:fillRef>
+          <a:effectRef idx="0">
+            <a:schemeClr val="accent1"/>
+          </a:effectRef>
+          <a:fontRef idx="minor">
+            <a:schemeClr val="lt1"/>
+          </a:fontRef>
+        </p:style>
+        <p:txBody>
+          <a:bodyPr rtlCol="0" anchor="ctr"/>
+          <a:lstStyle/>
+          <a:p>
+            <a:pPr algn="ctr"/>
+            <a:endParaRPr kumimoji="1" lang="zh-CN" altLang="en-US" dirty="0"/>
+          </a:p>
+        </p:txBody>
+      </p:sp>
+    </p:spTree>
+    <p:extLst>
+      <p:ext uri="{BB962C8B-B14F-4D97-AF65-F5344CB8AC3E}">
+        <p14:creationId xmlns:p14="http://schemas.microsoft.com/office/powerpoint/2010/main" val="1611749927"/>
+      </p:ext>
+    </p:extLst>
+  </p:cSld>
+  <p:clrMapOvr>
+    <a:masterClrMapping/>
+  </p:clrMapOvr>
+</p:sld>
+</file>
+
 <file path=ppt/slides/slide2.xml><?xml version="1.0" encoding="utf-8"?>
 <p:sld xmlns:a="http://schemas.openxmlformats.org/drawingml/2006/main" xmlns:r="http://schemas.openxmlformats.org/officeDocument/2006/relationships" xmlns:p="http://schemas.openxmlformats.org/presentationml/2006/main">
   <p:cSld>
@@ -10692,7 +12462,7 @@
         </p:nvSpPr>
         <p:spPr>
           <a:xfrm>
-            <a:off x="842062" y="1490630"/>
+            <a:off x="842062" y="1490400"/>
             <a:ext cx="216000" cy="144000"/>
           </a:xfrm>
           <a:prstGeom prst="rightArrow">
@@ -14569,55 +16339,6 @@
       </mc:AlternateContent>
       <p:sp>
         <p:nvSpPr>
-          <p:cNvPr id="84" name="右箭头 83">
-            <a:extLst>
-              <a:ext uri="{FF2B5EF4-FFF2-40B4-BE49-F238E27FC236}">
-                <a16:creationId xmlns:a16="http://schemas.microsoft.com/office/drawing/2014/main" id="{30E2BF01-4263-1A47-B471-2CB7EBA25E12}"/>
-              </a:ext>
-            </a:extLst>
-          </p:cNvPr>
-          <p:cNvSpPr/>
-          <p:nvPr/>
-        </p:nvSpPr>
-        <p:spPr>
-          <a:xfrm>
-            <a:off x="9279119" y="1433412"/>
-            <a:ext cx="216000" cy="144000"/>
-          </a:xfrm>
-          <a:prstGeom prst="rightArrow">
-            <a:avLst/>
-          </a:prstGeom>
-          <a:solidFill>
-            <a:srgbClr val="FFC000"/>
-          </a:solidFill>
-        </p:spPr>
-        <p:style>
-          <a:lnRef idx="2">
-            <a:schemeClr val="accent1">
-              <a:shade val="50000"/>
-            </a:schemeClr>
-          </a:lnRef>
-          <a:fillRef idx="1">
-            <a:schemeClr val="accent1"/>
-          </a:fillRef>
-          <a:effectRef idx="0">
-            <a:schemeClr val="accent1"/>
-          </a:effectRef>
-          <a:fontRef idx="minor">
-            <a:schemeClr val="lt1"/>
-          </a:fontRef>
-        </p:style>
-        <p:txBody>
-          <a:bodyPr rtlCol="0" anchor="ctr"/>
-          <a:lstStyle/>
-          <a:p>
-            <a:pPr algn="ctr"/>
-            <a:endParaRPr kumimoji="1" lang="zh-CN" altLang="en-US"/>
-          </a:p>
-        </p:txBody>
-      </p:sp>
-      <p:sp>
-        <p:nvSpPr>
           <p:cNvPr id="85" name="矩形 84">
             <a:extLst>
               <a:ext uri="{FF2B5EF4-FFF2-40B4-BE49-F238E27FC236}">
@@ -14682,7 +16403,7 @@
         </p:nvSpPr>
         <p:spPr>
           <a:xfrm>
-            <a:off x="9610827" y="1437764"/>
+            <a:off x="9610827" y="1490400"/>
             <a:ext cx="216000" cy="144000"/>
           </a:xfrm>
           <a:prstGeom prst="rightArrow">
@@ -14731,8 +16452,8 @@
         </p:nvSpPr>
         <p:spPr>
           <a:xfrm>
-            <a:off x="9834594" y="569026"/>
-            <a:ext cx="72000" cy="1897199"/>
+            <a:off x="9834594" y="586279"/>
+            <a:ext cx="36000" cy="1897199"/>
           </a:xfrm>
           <a:prstGeom prst="rect">
             <a:avLst/>
@@ -14810,7 +16531,7 @@
                         <a:rPr kumimoji="1" lang="en-US" altLang="zh-CN" sz="1400" b="0" i="1" smtClean="0">
                           <a:latin typeface="Cambria Math" panose="02040503050406030204" pitchFamily="18" charset="0"/>
                         </a:rPr>
-                        <m:t>1</m:t>
+                        <m:t>3</m:t>
                       </m:r>
                     </m:oMath>
                   </m:oMathPara>
@@ -17866,8 +19587,8 @@
             </p:nvSpPr>
             <p:spPr>
               <a:xfrm>
-                <a:off x="8989095" y="352800"/>
-                <a:ext cx="423514" cy="307777"/>
+                <a:off x="8935308" y="352800"/>
+                <a:ext cx="522900" cy="307777"/>
               </a:xfrm>
               <a:prstGeom prst="rect">
                 <a:avLst/>
@@ -17891,7 +19612,7 @@
                         <a:rPr kumimoji="1" lang="en-US" altLang="zh-CN" sz="1400" b="0" i="1" smtClean="0">
                           <a:latin typeface="Cambria Math" panose="02040503050406030204" pitchFamily="18" charset="0"/>
                         </a:rPr>
-                        <m:t>64</m:t>
+                        <m:t>128</m:t>
                       </m:r>
                     </m:oMath>
                   </m:oMathPara>
@@ -17918,8 +19639,8 @@
             </p:nvSpPr>
             <p:spPr>
               <a:xfrm>
-                <a:off x="8989095" y="352800"/>
-                <a:ext cx="423514" cy="307777"/>
+                <a:off x="8935308" y="352800"/>
+                <a:ext cx="522900" cy="307777"/>
               </a:xfrm>
               <a:prstGeom prst="rect">
                 <a:avLst/>
@@ -17962,8 +19683,8 @@
             </p:nvSpPr>
             <p:spPr>
               <a:xfrm>
-                <a:off x="9410434" y="334871"/>
-                <a:ext cx="324128" cy="307777"/>
+                <a:off x="9356647" y="334871"/>
+                <a:ext cx="423514" cy="307777"/>
               </a:xfrm>
               <a:prstGeom prst="rect">
                 <a:avLst/>
@@ -17987,7 +19708,7 @@
                         <a:rPr kumimoji="1" lang="en-US" altLang="zh-CN" sz="1400" b="0" i="1" smtClean="0">
                           <a:latin typeface="Cambria Math" panose="02040503050406030204" pitchFamily="18" charset="0"/>
                         </a:rPr>
-                        <m:t>3</m:t>
+                        <m:t>64</m:t>
                       </m:r>
                     </m:oMath>
                   </m:oMathPara>
@@ -18014,8 +19735,8 @@
             </p:nvSpPr>
             <p:spPr>
               <a:xfrm>
-                <a:off x="9410434" y="334871"/>
-                <a:ext cx="324128" cy="307777"/>
+                <a:off x="9356647" y="334871"/>
+                <a:ext cx="423514" cy="307777"/>
               </a:xfrm>
               <a:prstGeom prst="rect">
                 <a:avLst/>
@@ -18058,7 +19779,7 @@
             </p:nvSpPr>
             <p:spPr>
               <a:xfrm>
-                <a:off x="9724197" y="352800"/>
+                <a:off x="9706944" y="352800"/>
                 <a:ext cx="324128" cy="307777"/>
               </a:xfrm>
               <a:prstGeom prst="rect">
@@ -18110,7 +19831,7 @@
             </p:nvSpPr>
             <p:spPr>
               <a:xfrm>
-                <a:off x="9724197" y="352800"/>
+                <a:off x="9706944" y="352800"/>
                 <a:ext cx="324128" cy="307777"/>
               </a:xfrm>
               <a:prstGeom prst="rect">
@@ -18118,6 +19839,301 @@
               </a:prstGeom>
               <a:blipFill>
                 <a:blip r:embed="rId45"/>
+                <a:stretch>
+                  <a:fillRect/>
+                </a:stretch>
+              </a:blipFill>
+            </p:spPr>
+            <p:txBody>
+              <a:bodyPr/>
+              <a:lstStyle/>
+              <a:p>
+                <a:r>
+                  <a:rPr lang="zh-CN" altLang="en-US">
+                    <a:noFill/>
+                  </a:rPr>
+                  <a:t> </a:t>
+                </a:r>
+              </a:p>
+            </p:txBody>
+          </p:sp>
+        </mc:Fallback>
+      </mc:AlternateContent>
+      <p:sp>
+        <p:nvSpPr>
+          <p:cNvPr id="127" name="右箭头 126">
+            <a:extLst>
+              <a:ext uri="{FF2B5EF4-FFF2-40B4-BE49-F238E27FC236}">
+                <a16:creationId xmlns:a16="http://schemas.microsoft.com/office/drawing/2014/main" id="{0D65245A-EFEB-2D46-830D-16A0A7FAC0CE}"/>
+              </a:ext>
+            </a:extLst>
+          </p:cNvPr>
+          <p:cNvSpPr/>
+          <p:nvPr/>
+        </p:nvSpPr>
+        <p:spPr>
+          <a:xfrm rot="10800000" flipH="1">
+            <a:off x="1139179" y="1506812"/>
+            <a:ext cx="7956000" cy="82800"/>
+          </a:xfrm>
+          <a:prstGeom prst="rightArrow">
+            <a:avLst/>
+          </a:prstGeom>
+          <a:solidFill>
+            <a:schemeClr val="bg2"/>
+          </a:solidFill>
+        </p:spPr>
+        <p:style>
+          <a:lnRef idx="2">
+            <a:schemeClr val="accent1">
+              <a:shade val="50000"/>
+            </a:schemeClr>
+          </a:lnRef>
+          <a:fillRef idx="1">
+            <a:schemeClr val="accent1"/>
+          </a:fillRef>
+          <a:effectRef idx="0">
+            <a:schemeClr val="accent1"/>
+          </a:effectRef>
+          <a:fontRef idx="minor">
+            <a:schemeClr val="lt1"/>
+          </a:fontRef>
+        </p:style>
+        <p:txBody>
+          <a:bodyPr rtlCol="0" anchor="ctr"/>
+          <a:lstStyle/>
+          <a:p>
+            <a:pPr algn="ctr"/>
+            <a:endParaRPr kumimoji="1" lang="zh-CN" altLang="en-US"/>
+          </a:p>
+        </p:txBody>
+      </p:sp>
+      <p:sp>
+        <p:nvSpPr>
+          <p:cNvPr id="128" name="右箭头 127">
+            <a:extLst>
+              <a:ext uri="{FF2B5EF4-FFF2-40B4-BE49-F238E27FC236}">
+                <a16:creationId xmlns:a16="http://schemas.microsoft.com/office/drawing/2014/main" id="{DBA37ECD-169F-6D42-B82D-02D2E9D12FB4}"/>
+              </a:ext>
+            </a:extLst>
+          </p:cNvPr>
+          <p:cNvSpPr/>
+          <p:nvPr/>
+        </p:nvSpPr>
+        <p:spPr>
+          <a:xfrm>
+            <a:off x="9888735" y="1490400"/>
+            <a:ext cx="216000" cy="144000"/>
+          </a:xfrm>
+          <a:prstGeom prst="rightArrow">
+            <a:avLst/>
+          </a:prstGeom>
+          <a:solidFill>
+            <a:srgbClr val="7030A0"/>
+          </a:solidFill>
+        </p:spPr>
+        <p:style>
+          <a:lnRef idx="2">
+            <a:schemeClr val="accent1">
+              <a:shade val="50000"/>
+            </a:schemeClr>
+          </a:lnRef>
+          <a:fillRef idx="1">
+            <a:schemeClr val="accent1"/>
+          </a:fillRef>
+          <a:effectRef idx="0">
+            <a:schemeClr val="accent1"/>
+          </a:effectRef>
+          <a:fontRef idx="minor">
+            <a:schemeClr val="lt1"/>
+          </a:fontRef>
+        </p:style>
+        <p:txBody>
+          <a:bodyPr rtlCol="0" anchor="ctr"/>
+          <a:lstStyle/>
+          <a:p>
+            <a:pPr algn="ctr"/>
+            <a:endParaRPr kumimoji="1" lang="zh-CN" altLang="en-US"/>
+          </a:p>
+        </p:txBody>
+      </p:sp>
+      <p:sp>
+        <p:nvSpPr>
+          <p:cNvPr id="129" name="矩形 128">
+            <a:extLst>
+              <a:ext uri="{FF2B5EF4-FFF2-40B4-BE49-F238E27FC236}">
+                <a16:creationId xmlns:a16="http://schemas.microsoft.com/office/drawing/2014/main" id="{BC2742B7-7509-614F-BB74-4A2BB9150F3B}"/>
+              </a:ext>
+            </a:extLst>
+          </p:cNvPr>
+          <p:cNvSpPr/>
+          <p:nvPr/>
+        </p:nvSpPr>
+        <p:spPr>
+          <a:xfrm>
+            <a:off x="10130431" y="577993"/>
+            <a:ext cx="36000" cy="1897199"/>
+          </a:xfrm>
+          <a:prstGeom prst="rect">
+            <a:avLst/>
+          </a:prstGeom>
+          <a:solidFill>
+            <a:schemeClr val="accent5">
+              <a:lumMod val="20000"/>
+              <a:lumOff val="80000"/>
+            </a:schemeClr>
+          </a:solidFill>
+        </p:spPr>
+        <p:style>
+          <a:lnRef idx="2">
+            <a:schemeClr val="accent1">
+              <a:shade val="50000"/>
+            </a:schemeClr>
+          </a:lnRef>
+          <a:fillRef idx="1">
+            <a:schemeClr val="accent1"/>
+          </a:fillRef>
+          <a:effectRef idx="0">
+            <a:schemeClr val="accent1"/>
+          </a:effectRef>
+          <a:fontRef idx="minor">
+            <a:schemeClr val="lt1"/>
+          </a:fontRef>
+        </p:style>
+        <p:txBody>
+          <a:bodyPr rtlCol="0" anchor="ctr"/>
+          <a:lstStyle/>
+          <a:p>
+            <a:pPr algn="ctr"/>
+            <a:endParaRPr kumimoji="1" lang="zh-CN" altLang="en-US"/>
+          </a:p>
+        </p:txBody>
+      </p:sp>
+      <p:sp>
+        <p:nvSpPr>
+          <p:cNvPr id="130" name="右箭头 129">
+            <a:extLst>
+              <a:ext uri="{FF2B5EF4-FFF2-40B4-BE49-F238E27FC236}">
+                <a16:creationId xmlns:a16="http://schemas.microsoft.com/office/drawing/2014/main" id="{D4D68EDD-AC54-D340-82D4-AAEFFF885697}"/>
+              </a:ext>
+            </a:extLst>
+          </p:cNvPr>
+          <p:cNvSpPr/>
+          <p:nvPr/>
+        </p:nvSpPr>
+        <p:spPr>
+          <a:xfrm>
+            <a:off x="9280986" y="1490400"/>
+            <a:ext cx="216000" cy="144000"/>
+          </a:xfrm>
+          <a:prstGeom prst="rightArrow">
+            <a:avLst/>
+          </a:prstGeom>
+          <a:solidFill>
+            <a:srgbClr val="00B0F0"/>
+          </a:solidFill>
+        </p:spPr>
+        <p:style>
+          <a:lnRef idx="2">
+            <a:schemeClr val="accent1">
+              <a:shade val="50000"/>
+            </a:schemeClr>
+          </a:lnRef>
+          <a:fillRef idx="1">
+            <a:schemeClr val="accent1"/>
+          </a:fillRef>
+          <a:effectRef idx="0">
+            <a:schemeClr val="accent1"/>
+          </a:effectRef>
+          <a:fontRef idx="minor">
+            <a:schemeClr val="lt1"/>
+          </a:fontRef>
+        </p:style>
+        <p:txBody>
+          <a:bodyPr rtlCol="0" anchor="ctr"/>
+          <a:lstStyle/>
+          <a:p>
+            <a:pPr algn="ctr"/>
+            <a:endParaRPr kumimoji="1" lang="zh-CN" altLang="en-US"/>
+          </a:p>
+        </p:txBody>
+      </p:sp>
+      <mc:AlternateContent xmlns:mc="http://schemas.openxmlformats.org/markup-compatibility/2006" xmlns:a14="http://schemas.microsoft.com/office/drawing/2010/main">
+        <mc:Choice Requires="a14">
+          <p:sp>
+            <p:nvSpPr>
+              <p:cNvPr id="131" name="文本框 130">
+                <a:extLst>
+                  <a:ext uri="{FF2B5EF4-FFF2-40B4-BE49-F238E27FC236}">
+                    <a16:creationId xmlns:a16="http://schemas.microsoft.com/office/drawing/2014/main" id="{D88CD96E-D54D-7F43-8B4F-E6F109D09765}"/>
+                  </a:ext>
+                </a:extLst>
+              </p:cNvPr>
+              <p:cNvSpPr txBox="1"/>
+              <p:nvPr/>
+            </p:nvSpPr>
+            <p:spPr>
+              <a:xfrm>
+                <a:off x="10004129" y="361768"/>
+                <a:ext cx="324128" cy="307777"/>
+              </a:xfrm>
+              <a:prstGeom prst="rect">
+                <a:avLst/>
+              </a:prstGeom>
+              <a:noFill/>
+            </p:spPr>
+            <p:txBody>
+              <a:bodyPr wrap="none" rtlCol="0">
+                <a:spAutoFit/>
+              </a:bodyPr>
+              <a:lstStyle/>
+              <a:p>
+                <a:pPr/>
+                <a14:m>
+                  <m:oMathPara xmlns:m="http://schemas.openxmlformats.org/officeDocument/2006/math">
+                    <m:oMathParaPr>
+                      <m:jc m:val="centerGroup"/>
+                    </m:oMathParaPr>
+                    <m:oMath xmlns:m="http://schemas.openxmlformats.org/officeDocument/2006/math">
+                      <m:r>
+                        <a:rPr kumimoji="1" lang="en-US" altLang="zh-CN" sz="1400" b="0" i="1" smtClean="0">
+                          <a:latin typeface="Cambria Math" panose="02040503050406030204" pitchFamily="18" charset="0"/>
+                        </a:rPr>
+                        <m:t>3</m:t>
+                      </m:r>
+                    </m:oMath>
+                  </m:oMathPara>
+                </a14:m>
+                <a:endParaRPr kumimoji="1" lang="en-US" altLang="zh-CN" sz="1400" b="0" dirty="0"/>
+              </a:p>
+            </p:txBody>
+          </p:sp>
+        </mc:Choice>
+        <mc:Fallback xmlns="">
+          <p:sp>
+            <p:nvSpPr>
+              <p:cNvPr id="131" name="文本框 130">
+                <a:extLst>
+                  <a:ext uri="{FF2B5EF4-FFF2-40B4-BE49-F238E27FC236}">
+                    <a16:creationId xmlns:a16="http://schemas.microsoft.com/office/drawing/2014/main" id="{D88CD96E-D54D-7F43-8B4F-E6F109D09765}"/>
+                  </a:ext>
+                </a:extLst>
+              </p:cNvPr>
+              <p:cNvSpPr txBox="1">
+                <a:spLocks noRot="1" noChangeAspect="1" noMove="1" noResize="1" noEditPoints="1" noAdjustHandles="1" noChangeArrowheads="1" noChangeShapeType="1" noTextEdit="1"/>
+              </p:cNvSpPr>
+              <p:nvPr/>
+            </p:nvSpPr>
+            <p:spPr>
+              <a:xfrm>
+                <a:off x="10004129" y="361768"/>
+                <a:ext cx="324128" cy="307777"/>
+              </a:xfrm>
+              <a:prstGeom prst="rect">
+                <a:avLst/>
+              </a:prstGeom>
+              <a:blipFill>
+                <a:blip r:embed="rId46"/>
                 <a:stretch>
                   <a:fillRect/>
                 </a:stretch>

</xml_diff>